<commit_message>
Update office rage pres
</commit_message>
<xml_diff>
--- a/Office_Rage_Presentation.pptx
+++ b/Office_Rage_Presentation.pptx
@@ -10,11 +10,12 @@
     <p:sldId id="259" r:id="rId4"/>
     <p:sldId id="261" r:id="rId5"/>
     <p:sldId id="260" r:id="rId6"/>
-    <p:sldId id="262" r:id="rId7"/>
-    <p:sldId id="265" r:id="rId8"/>
-    <p:sldId id="263" r:id="rId9"/>
-    <p:sldId id="264" r:id="rId10"/>
-    <p:sldId id="266" r:id="rId11"/>
+    <p:sldId id="267" r:id="rId7"/>
+    <p:sldId id="262" r:id="rId8"/>
+    <p:sldId id="265" r:id="rId9"/>
+    <p:sldId id="263" r:id="rId10"/>
+    <p:sldId id="264" r:id="rId11"/>
+    <p:sldId id="266" r:id="rId12"/>
   </p:sldIdLst>
   <p:sldSz cx="12192000" cy="6858000"/>
   <p:notesSz cx="6858000" cy="9144000"/>
@@ -113,6 +114,11 @@
       </a:defRPr>
     </a:lvl9pPr>
   </p:defaultTextStyle>
+  <p:extLst>
+    <p:ext uri="{EFAFB233-063F-42B5-8137-9DF3F51BA10A}">
+      <p15:sldGuideLst xmlns:p15="http://schemas.microsoft.com/office/powerpoint/2012/main"/>
+    </p:ext>
+  </p:extLst>
 </p:presentation>
 </file>
 
@@ -263,7 +269,7 @@
           <a:p>
             <a:fld id="{073ED0CC-082F-4160-86E5-0D6041F12778}" type="datetime1">
               <a:rPr lang="en-US" smtClean="0"/>
-              <a:t>11/19/2019</a:t>
+              <a:t>11/21/2019</a:t>
             </a:fld>
             <a:endParaRPr lang="en-US" dirty="0"/>
           </a:p>
@@ -317,7 +323,7 @@
           <a:p>
             <a:fld id="{3A98EE3D-8CD1-4C3F-BD1C-C98C9596463C}" type="slidenum">
               <a:rPr lang="en-US" smtClean="0"/>
-              <a:t>‹N°›</a:t>
+              <a:t>‹#›</a:t>
             </a:fld>
             <a:endParaRPr lang="en-US" dirty="0"/>
           </a:p>
@@ -462,7 +468,7 @@
           <a:p>
             <a:fld id="{073ED0CC-082F-4160-86E5-0D6041F12778}" type="datetime1">
               <a:rPr lang="en-US" smtClean="0"/>
-              <a:t>11/19/2019</a:t>
+              <a:t>11/21/2019</a:t>
             </a:fld>
             <a:endParaRPr lang="en-US" dirty="0"/>
           </a:p>
@@ -516,7 +522,7 @@
           <a:p>
             <a:fld id="{3A98EE3D-8CD1-4C3F-BD1C-C98C9596463C}" type="slidenum">
               <a:rPr lang="en-US" smtClean="0"/>
-              <a:t>‹N°›</a:t>
+              <a:t>‹#›</a:t>
             </a:fld>
             <a:endParaRPr lang="en-US" dirty="0"/>
           </a:p>
@@ -671,7 +677,7 @@
           <a:p>
             <a:fld id="{073ED0CC-082F-4160-86E5-0D6041F12778}" type="datetime1">
               <a:rPr lang="en-US" smtClean="0"/>
-              <a:t>11/19/2019</a:t>
+              <a:t>11/21/2019</a:t>
             </a:fld>
             <a:endParaRPr lang="en-US" dirty="0"/>
           </a:p>
@@ -725,7 +731,7 @@
           <a:p>
             <a:fld id="{3A98EE3D-8CD1-4C3F-BD1C-C98C9596463C}" type="slidenum">
               <a:rPr lang="en-US" smtClean="0"/>
-              <a:t>‹N°›</a:t>
+              <a:t>‹#›</a:t>
             </a:fld>
             <a:endParaRPr lang="en-US" dirty="0"/>
           </a:p>
@@ -870,7 +876,7 @@
           <a:p>
             <a:fld id="{073ED0CC-082F-4160-86E5-0D6041F12778}" type="datetime1">
               <a:rPr lang="en-US" smtClean="0"/>
-              <a:t>11/19/2019</a:t>
+              <a:t>11/21/2019</a:t>
             </a:fld>
             <a:endParaRPr lang="en-US" dirty="0"/>
           </a:p>
@@ -924,7 +930,7 @@
           <a:p>
             <a:fld id="{3A98EE3D-8CD1-4C3F-BD1C-C98C9596463C}" type="slidenum">
               <a:rPr lang="en-US" smtClean="0"/>
-              <a:t>‹N°›</a:t>
+              <a:t>‹#›</a:t>
             </a:fld>
             <a:endParaRPr lang="en-US" dirty="0"/>
           </a:p>
@@ -1146,7 +1152,7 @@
           <a:p>
             <a:fld id="{073ED0CC-082F-4160-86E5-0D6041F12778}" type="datetime1">
               <a:rPr lang="en-US" smtClean="0"/>
-              <a:t>11/19/2019</a:t>
+              <a:t>11/21/2019</a:t>
             </a:fld>
             <a:endParaRPr lang="en-US" dirty="0"/>
           </a:p>
@@ -1200,7 +1206,7 @@
           <a:p>
             <a:fld id="{3A98EE3D-8CD1-4C3F-BD1C-C98C9596463C}" type="slidenum">
               <a:rPr lang="en-US" smtClean="0"/>
-              <a:t>‹N°›</a:t>
+              <a:t>‹#›</a:t>
             </a:fld>
             <a:endParaRPr lang="en-US" dirty="0"/>
           </a:p>
@@ -1412,7 +1418,7 @@
           <a:p>
             <a:fld id="{073ED0CC-082F-4160-86E5-0D6041F12778}" type="datetime1">
               <a:rPr lang="en-US" smtClean="0"/>
-              <a:t>11/19/2019</a:t>
+              <a:t>11/21/2019</a:t>
             </a:fld>
             <a:endParaRPr lang="en-US" dirty="0"/>
           </a:p>
@@ -1466,7 +1472,7 @@
           <a:p>
             <a:fld id="{3A98EE3D-8CD1-4C3F-BD1C-C98C9596463C}" type="slidenum">
               <a:rPr lang="en-US" smtClean="0"/>
-              <a:t>‹N°›</a:t>
+              <a:t>‹#›</a:t>
             </a:fld>
             <a:endParaRPr lang="en-US" dirty="0"/>
           </a:p>
@@ -1825,7 +1831,7 @@
           <a:p>
             <a:fld id="{073ED0CC-082F-4160-86E5-0D6041F12778}" type="datetime1">
               <a:rPr lang="en-US" smtClean="0"/>
-              <a:t>11/19/2019</a:t>
+              <a:t>11/21/2019</a:t>
             </a:fld>
             <a:endParaRPr lang="en-US" dirty="0"/>
           </a:p>
@@ -1879,7 +1885,7 @@
           <a:p>
             <a:fld id="{3A98EE3D-8CD1-4C3F-BD1C-C98C9596463C}" type="slidenum">
               <a:rPr lang="en-US" smtClean="0"/>
-              <a:t>‹N°›</a:t>
+              <a:t>‹#›</a:t>
             </a:fld>
             <a:endParaRPr lang="en-US" dirty="0"/>
           </a:p>
@@ -1967,7 +1973,7 @@
           <a:p>
             <a:fld id="{073ED0CC-082F-4160-86E5-0D6041F12778}" type="datetime1">
               <a:rPr lang="en-US" smtClean="0"/>
-              <a:t>11/19/2019</a:t>
+              <a:t>11/21/2019</a:t>
             </a:fld>
             <a:endParaRPr lang="en-US" dirty="0"/>
           </a:p>
@@ -2021,7 +2027,7 @@
           <a:p>
             <a:fld id="{3A98EE3D-8CD1-4C3F-BD1C-C98C9596463C}" type="slidenum">
               <a:rPr lang="en-US" smtClean="0"/>
-              <a:t>‹N°›</a:t>
+              <a:t>‹#›</a:t>
             </a:fld>
             <a:endParaRPr lang="en-US" dirty="0"/>
           </a:p>
@@ -2081,7 +2087,7 @@
           <a:p>
             <a:fld id="{073ED0CC-082F-4160-86E5-0D6041F12778}" type="datetime1">
               <a:rPr lang="en-US" smtClean="0"/>
-              <a:t>11/19/2019</a:t>
+              <a:t>11/21/2019</a:t>
             </a:fld>
             <a:endParaRPr lang="en-US" dirty="0"/>
           </a:p>
@@ -2135,7 +2141,7 @@
           <a:p>
             <a:fld id="{3A98EE3D-8CD1-4C3F-BD1C-C98C9596463C}" type="slidenum">
               <a:rPr lang="en-US" smtClean="0"/>
-              <a:t>‹N°›</a:t>
+              <a:t>‹#›</a:t>
             </a:fld>
             <a:endParaRPr lang="en-US" dirty="0"/>
           </a:p>
@@ -2393,7 +2399,7 @@
           <a:p>
             <a:fld id="{073ED0CC-082F-4160-86E5-0D6041F12778}" type="datetime1">
               <a:rPr lang="en-US" smtClean="0"/>
-              <a:t>11/19/2019</a:t>
+              <a:t>11/21/2019</a:t>
             </a:fld>
             <a:endParaRPr lang="en-US" dirty="0"/>
           </a:p>
@@ -2447,7 +2453,7 @@
           <a:p>
             <a:fld id="{3A98EE3D-8CD1-4C3F-BD1C-C98C9596463C}" type="slidenum">
               <a:rPr lang="en-US" smtClean="0"/>
-              <a:t>‹N°›</a:t>
+              <a:t>‹#›</a:t>
             </a:fld>
             <a:endParaRPr lang="en-US" dirty="0"/>
           </a:p>
@@ -2682,7 +2688,7 @@
           <a:p>
             <a:fld id="{073ED0CC-082F-4160-86E5-0D6041F12778}" type="datetime1">
               <a:rPr lang="en-US" smtClean="0"/>
-              <a:t>11/19/2019</a:t>
+              <a:t>11/21/2019</a:t>
             </a:fld>
             <a:endParaRPr lang="en-US" dirty="0"/>
           </a:p>
@@ -2736,7 +2742,7 @@
           <a:p>
             <a:fld id="{3A98EE3D-8CD1-4C3F-BD1C-C98C9596463C}" type="slidenum">
               <a:rPr lang="en-US" smtClean="0"/>
-              <a:t>‹N°›</a:t>
+              <a:t>‹#›</a:t>
             </a:fld>
             <a:endParaRPr lang="en-US" dirty="0"/>
           </a:p>
@@ -2924,7 +2930,7 @@
           <a:p>
             <a:fld id="{073ED0CC-082F-4160-86E5-0D6041F12778}" type="datetime1">
               <a:rPr lang="en-US" smtClean="0"/>
-              <a:t>11/19/2019</a:t>
+              <a:t>11/21/2019</a:t>
             </a:fld>
             <a:endParaRPr lang="en-US" dirty="0"/>
           </a:p>
@@ -3014,7 +3020,7 @@
           <a:p>
             <a:fld id="{3A98EE3D-8CD1-4C3F-BD1C-C98C9596463C}" type="slidenum">
               <a:rPr lang="en-US" smtClean="0"/>
-              <a:t>‹N°›</a:t>
+              <a:t>‹#›</a:t>
             </a:fld>
             <a:endParaRPr lang="en-US" dirty="0"/>
           </a:p>
@@ -4085,13 +4091,13 @@
   <p:clrMapOvr>
     <a:masterClrMapping/>
   </p:clrMapOvr>
-  <mc:AlternateContent xmlns:mc="http://schemas.openxmlformats.org/markup-compatibility/2006">
-    <mc:Choice xmlns:p14="http://schemas.microsoft.com/office/powerpoint/2010/main" Requires="p14">
+  <mc:AlternateContent xmlns:mc="http://schemas.openxmlformats.org/markup-compatibility/2006" xmlns:p14="http://schemas.microsoft.com/office/powerpoint/2010/main">
+    <mc:Choice Requires="p14">
       <p:transition spd="med" p14:dur="700">
         <p:fade/>
       </p:transition>
     </mc:Choice>
-    <mc:Fallback>
+    <mc:Fallback xmlns="">
       <p:transition spd="med">
         <p:fade/>
       </p:transition>
@@ -4101,1764 +4107,6 @@
 </file>
 
 <file path=ppt/slides/slide10.xml><?xml version="1.0" encoding="utf-8"?>
-<p:sld xmlns:a="http://schemas.openxmlformats.org/drawingml/2006/main" xmlns:r="http://schemas.openxmlformats.org/officeDocument/2006/relationships" xmlns:p="http://schemas.openxmlformats.org/presentationml/2006/main">
-  <p:cSld>
-    <p:spTree>
-      <p:nvGrpSpPr>
-        <p:cNvPr id="1" name=""/>
-        <p:cNvGrpSpPr/>
-        <p:nvPr/>
-      </p:nvGrpSpPr>
-      <p:grpSpPr>
-        <a:xfrm>
-          <a:off x="0" y="0"/>
-          <a:ext cx="0" cy="0"/>
-          <a:chOff x="0" y="0"/>
-          <a:chExt cx="0" cy="0"/>
-        </a:xfrm>
-      </p:grpSpPr>
-      <p:pic>
-        <p:nvPicPr>
-          <p:cNvPr id="17" name="Image 16" descr="Une image contenant bâtiment, cité, grand, assis&#10;&#10;Description générée automatiquement">
-            <a:extLst>
-              <a:ext uri="{FF2B5EF4-FFF2-40B4-BE49-F238E27FC236}">
-                <a16:creationId xmlns:a16="http://schemas.microsoft.com/office/drawing/2014/main" id="{6CF04101-E0D4-4105-A8F6-73217A3E211B}"/>
-              </a:ext>
-            </a:extLst>
-          </p:cNvPr>
-          <p:cNvPicPr>
-            <a:picLocks noChangeAspect="1"/>
-          </p:cNvPicPr>
-          <p:nvPr/>
-        </p:nvPicPr>
-        <p:blipFill>
-          <a:blip r:embed="rId2">
-            <a:extLst>
-              <a:ext uri="{28A0092B-C50C-407E-A947-70E740481C1C}">
-                <a14:useLocalDpi xmlns:a14="http://schemas.microsoft.com/office/drawing/2010/main" val="0"/>
-              </a:ext>
-            </a:extLst>
-          </a:blip>
-          <a:stretch>
-            <a:fillRect/>
-          </a:stretch>
-        </p:blipFill>
-        <p:spPr>
-          <a:xfrm>
-            <a:off x="0" y="0"/>
-            <a:ext cx="12192000" cy="6868732"/>
-          </a:xfrm>
-          <a:prstGeom prst="rect">
-            <a:avLst/>
-          </a:prstGeom>
-        </p:spPr>
-      </p:pic>
-      <p:sp>
-        <p:nvSpPr>
-          <p:cNvPr id="2" name="Titre 1">
-            <a:extLst>
-              <a:ext uri="{FF2B5EF4-FFF2-40B4-BE49-F238E27FC236}">
-                <a16:creationId xmlns:a16="http://schemas.microsoft.com/office/drawing/2014/main" id="{461C7968-4A46-4689-AB1E-51CA29617B56}"/>
-              </a:ext>
-            </a:extLst>
-          </p:cNvPr>
-          <p:cNvSpPr>
-            <a:spLocks noGrp="1"/>
-          </p:cNvSpPr>
-          <p:nvPr>
-            <p:ph type="ctrTitle"/>
-          </p:nvPr>
-        </p:nvSpPr>
-        <p:spPr>
-          <a:xfrm>
-            <a:off x="3946584" y="311968"/>
-            <a:ext cx="4298832" cy="1088336"/>
-          </a:xfrm>
-        </p:spPr>
-        <p:txBody>
-          <a:bodyPr>
-            <a:normAutofit/>
-          </a:bodyPr>
-          <a:lstStyle/>
-          <a:p>
-            <a:r>
-              <a:rPr lang="fr-FR" b="1" dirty="0">
-                <a:solidFill>
-                  <a:srgbClr val="FF0000"/>
-                </a:solidFill>
-                <a:latin typeface="+mn-lt"/>
-                <a:cs typeface="Times New Roman" panose="02020603050405020304" pitchFamily="18" charset="0"/>
-              </a:rPr>
-              <a:t>OFFICE RAGE</a:t>
-            </a:r>
-          </a:p>
-        </p:txBody>
-      </p:sp>
-      <p:sp>
-        <p:nvSpPr>
-          <p:cNvPr id="20" name="Sous-titre 19">
-            <a:extLst>
-              <a:ext uri="{FF2B5EF4-FFF2-40B4-BE49-F238E27FC236}">
-                <a16:creationId xmlns:a16="http://schemas.microsoft.com/office/drawing/2014/main" id="{FBAA5A9B-B58B-416D-9391-76D34BEFACF5}"/>
-              </a:ext>
-            </a:extLst>
-          </p:cNvPr>
-          <p:cNvSpPr>
-            <a:spLocks noGrp="1"/>
-          </p:cNvSpPr>
-          <p:nvPr>
-            <p:ph type="subTitle" idx="1"/>
-          </p:nvPr>
-        </p:nvSpPr>
-        <p:spPr>
-          <a:xfrm>
-            <a:off x="553584" y="1617961"/>
-            <a:ext cx="2458456" cy="616027"/>
-          </a:xfrm>
-        </p:spPr>
-        <p:txBody>
-          <a:bodyPr>
-            <a:normAutofit/>
-          </a:bodyPr>
-          <a:lstStyle/>
-          <a:p>
-            <a:r>
-              <a:rPr lang="fr-FR" b="1" dirty="0"/>
-              <a:t>Alexandre SACHS</a:t>
-            </a:r>
-          </a:p>
-        </p:txBody>
-      </p:sp>
-      <p:sp>
-        <p:nvSpPr>
-          <p:cNvPr id="23" name="Sous-titre 19">
-            <a:extLst>
-              <a:ext uri="{FF2B5EF4-FFF2-40B4-BE49-F238E27FC236}">
-                <a16:creationId xmlns:a16="http://schemas.microsoft.com/office/drawing/2014/main" id="{FA048EA7-E52E-4C96-9A7F-23E5D2BEFD44}"/>
-              </a:ext>
-            </a:extLst>
-          </p:cNvPr>
-          <p:cNvSpPr txBox="1">
-            <a:spLocks/>
-          </p:cNvSpPr>
-          <p:nvPr/>
-        </p:nvSpPr>
-        <p:spPr>
-          <a:xfrm>
-            <a:off x="4946021" y="3371316"/>
-            <a:ext cx="2458456" cy="616027"/>
-          </a:xfrm>
-          <a:prstGeom prst="rect">
-            <a:avLst/>
-          </a:prstGeom>
-        </p:spPr>
-        <p:txBody>
-          <a:bodyPr vert="horz" lIns="91440" tIns="45720" rIns="91440" bIns="45720" rtlCol="0">
-            <a:normAutofit/>
-          </a:bodyPr>
-          <a:lstStyle>
-            <a:lvl1pPr marL="0" indent="0" algn="ctr" defTabSz="914400" rtl="0" eaLnBrk="1" latinLnBrk="0" hangingPunct="1">
-              <a:lnSpc>
-                <a:spcPct val="90000"/>
-              </a:lnSpc>
-              <a:spcBef>
-                <a:spcPts val="1000"/>
-              </a:spcBef>
-              <a:buFont typeface="Arial" panose="020B0604020202020204" pitchFamily="34" charset="0"/>
-              <a:buNone/>
-              <a:defRPr sz="2400" kern="1200">
-                <a:solidFill>
-                  <a:schemeClr val="tx1"/>
-                </a:solidFill>
-                <a:latin typeface="+mn-lt"/>
-                <a:ea typeface="+mn-ea"/>
-                <a:cs typeface="+mn-cs"/>
-              </a:defRPr>
-            </a:lvl1pPr>
-            <a:lvl2pPr marL="457200" indent="0" algn="ctr" defTabSz="914400" rtl="0" eaLnBrk="1" latinLnBrk="0" hangingPunct="1">
-              <a:lnSpc>
-                <a:spcPct val="90000"/>
-              </a:lnSpc>
-              <a:spcBef>
-                <a:spcPts val="500"/>
-              </a:spcBef>
-              <a:buFont typeface="Arial" panose="020B0604020202020204" pitchFamily="34" charset="0"/>
-              <a:buNone/>
-              <a:defRPr sz="2000" kern="1200">
-                <a:solidFill>
-                  <a:schemeClr val="tx1"/>
-                </a:solidFill>
-                <a:latin typeface="+mn-lt"/>
-                <a:ea typeface="+mn-ea"/>
-                <a:cs typeface="+mn-cs"/>
-              </a:defRPr>
-            </a:lvl2pPr>
-            <a:lvl3pPr marL="914400" indent="0" algn="ctr" defTabSz="914400" rtl="0" eaLnBrk="1" latinLnBrk="0" hangingPunct="1">
-              <a:lnSpc>
-                <a:spcPct val="90000"/>
-              </a:lnSpc>
-              <a:spcBef>
-                <a:spcPts val="500"/>
-              </a:spcBef>
-              <a:buFont typeface="Arial" panose="020B0604020202020204" pitchFamily="34" charset="0"/>
-              <a:buNone/>
-              <a:defRPr sz="1800" kern="1200">
-                <a:solidFill>
-                  <a:schemeClr val="tx1"/>
-                </a:solidFill>
-                <a:latin typeface="+mn-lt"/>
-                <a:ea typeface="+mn-ea"/>
-                <a:cs typeface="+mn-cs"/>
-              </a:defRPr>
-            </a:lvl3pPr>
-            <a:lvl4pPr marL="1371600" indent="0" algn="ctr" defTabSz="914400" rtl="0" eaLnBrk="1" latinLnBrk="0" hangingPunct="1">
-              <a:lnSpc>
-                <a:spcPct val="90000"/>
-              </a:lnSpc>
-              <a:spcBef>
-                <a:spcPts val="500"/>
-              </a:spcBef>
-              <a:buFont typeface="Arial" panose="020B0604020202020204" pitchFamily="34" charset="0"/>
-              <a:buNone/>
-              <a:defRPr sz="1600" kern="1200">
-                <a:solidFill>
-                  <a:schemeClr val="tx1"/>
-                </a:solidFill>
-                <a:latin typeface="+mn-lt"/>
-                <a:ea typeface="+mn-ea"/>
-                <a:cs typeface="+mn-cs"/>
-              </a:defRPr>
-            </a:lvl4pPr>
-            <a:lvl5pPr marL="1828800" indent="0" algn="ctr" defTabSz="914400" rtl="0" eaLnBrk="1" latinLnBrk="0" hangingPunct="1">
-              <a:lnSpc>
-                <a:spcPct val="90000"/>
-              </a:lnSpc>
-              <a:spcBef>
-                <a:spcPts val="500"/>
-              </a:spcBef>
-              <a:buFont typeface="Arial" panose="020B0604020202020204" pitchFamily="34" charset="0"/>
-              <a:buNone/>
-              <a:defRPr sz="1600" kern="1200">
-                <a:solidFill>
-                  <a:schemeClr val="tx1"/>
-                </a:solidFill>
-                <a:latin typeface="+mn-lt"/>
-                <a:ea typeface="+mn-ea"/>
-                <a:cs typeface="+mn-cs"/>
-              </a:defRPr>
-            </a:lvl5pPr>
-            <a:lvl6pPr marL="2286000" indent="0" algn="ctr" defTabSz="914400" rtl="0" eaLnBrk="1" latinLnBrk="0" hangingPunct="1">
-              <a:lnSpc>
-                <a:spcPct val="90000"/>
-              </a:lnSpc>
-              <a:spcBef>
-                <a:spcPts val="500"/>
-              </a:spcBef>
-              <a:buFont typeface="Arial" panose="020B0604020202020204" pitchFamily="34" charset="0"/>
-              <a:buNone/>
-              <a:defRPr sz="1600" kern="1200">
-                <a:solidFill>
-                  <a:schemeClr val="tx1"/>
-                </a:solidFill>
-                <a:latin typeface="+mn-lt"/>
-                <a:ea typeface="+mn-ea"/>
-                <a:cs typeface="+mn-cs"/>
-              </a:defRPr>
-            </a:lvl6pPr>
-            <a:lvl7pPr marL="2743200" indent="0" algn="ctr" defTabSz="914400" rtl="0" eaLnBrk="1" latinLnBrk="0" hangingPunct="1">
-              <a:lnSpc>
-                <a:spcPct val="90000"/>
-              </a:lnSpc>
-              <a:spcBef>
-                <a:spcPts val="500"/>
-              </a:spcBef>
-              <a:buFont typeface="Arial" panose="020B0604020202020204" pitchFamily="34" charset="0"/>
-              <a:buNone/>
-              <a:defRPr sz="1600" kern="1200">
-                <a:solidFill>
-                  <a:schemeClr val="tx1"/>
-                </a:solidFill>
-                <a:latin typeface="+mn-lt"/>
-                <a:ea typeface="+mn-ea"/>
-                <a:cs typeface="+mn-cs"/>
-              </a:defRPr>
-            </a:lvl7pPr>
-            <a:lvl8pPr marL="3200400" indent="0" algn="ctr" defTabSz="914400" rtl="0" eaLnBrk="1" latinLnBrk="0" hangingPunct="1">
-              <a:lnSpc>
-                <a:spcPct val="90000"/>
-              </a:lnSpc>
-              <a:spcBef>
-                <a:spcPts val="500"/>
-              </a:spcBef>
-              <a:buFont typeface="Arial" panose="020B0604020202020204" pitchFamily="34" charset="0"/>
-              <a:buNone/>
-              <a:defRPr sz="1600" kern="1200">
-                <a:solidFill>
-                  <a:schemeClr val="tx1"/>
-                </a:solidFill>
-                <a:latin typeface="+mn-lt"/>
-                <a:ea typeface="+mn-ea"/>
-                <a:cs typeface="+mn-cs"/>
-              </a:defRPr>
-            </a:lvl8pPr>
-            <a:lvl9pPr marL="3657600" indent="0" algn="ctr" defTabSz="914400" rtl="0" eaLnBrk="1" latinLnBrk="0" hangingPunct="1">
-              <a:lnSpc>
-                <a:spcPct val="90000"/>
-              </a:lnSpc>
-              <a:spcBef>
-                <a:spcPts val="500"/>
-              </a:spcBef>
-              <a:buFont typeface="Arial" panose="020B0604020202020204" pitchFamily="34" charset="0"/>
-              <a:buNone/>
-              <a:defRPr sz="1600" kern="1200">
-                <a:solidFill>
-                  <a:schemeClr val="tx1"/>
-                </a:solidFill>
-                <a:latin typeface="+mn-lt"/>
-                <a:ea typeface="+mn-ea"/>
-                <a:cs typeface="+mn-cs"/>
-              </a:defRPr>
-            </a:lvl9pPr>
-          </a:lstStyle>
-          <a:p>
-            <a:r>
-              <a:rPr lang="fr-FR" b="1" dirty="0"/>
-              <a:t>Charles </a:t>
-            </a:r>
-            <a:r>
-              <a:rPr lang="fr-FR" b="1" dirty="0" err="1"/>
-              <a:t>Descoust</a:t>
-            </a:r>
-            <a:endParaRPr lang="fr-FR" b="1" dirty="0"/>
-          </a:p>
-        </p:txBody>
-      </p:sp>
-      <p:sp>
-        <p:nvSpPr>
-          <p:cNvPr id="24" name="Sous-titre 19">
-            <a:extLst>
-              <a:ext uri="{FF2B5EF4-FFF2-40B4-BE49-F238E27FC236}">
-                <a16:creationId xmlns:a16="http://schemas.microsoft.com/office/drawing/2014/main" id="{BD9014D6-A435-4343-95FD-BEF39B9EEDA0}"/>
-              </a:ext>
-            </a:extLst>
-          </p:cNvPr>
-          <p:cNvSpPr txBox="1">
-            <a:spLocks/>
-          </p:cNvSpPr>
-          <p:nvPr/>
-        </p:nvSpPr>
-        <p:spPr>
-          <a:xfrm>
-            <a:off x="7016188" y="1712272"/>
-            <a:ext cx="2458456" cy="616027"/>
-          </a:xfrm>
-          <a:prstGeom prst="rect">
-            <a:avLst/>
-          </a:prstGeom>
-        </p:spPr>
-        <p:txBody>
-          <a:bodyPr vert="horz" lIns="91440" tIns="45720" rIns="91440" bIns="45720" rtlCol="0">
-            <a:normAutofit/>
-          </a:bodyPr>
-          <a:lstStyle>
-            <a:lvl1pPr marL="0" indent="0" algn="ctr" defTabSz="914400" rtl="0" eaLnBrk="1" latinLnBrk="0" hangingPunct="1">
-              <a:lnSpc>
-                <a:spcPct val="90000"/>
-              </a:lnSpc>
-              <a:spcBef>
-                <a:spcPts val="1000"/>
-              </a:spcBef>
-              <a:buFont typeface="Arial" panose="020B0604020202020204" pitchFamily="34" charset="0"/>
-              <a:buNone/>
-              <a:defRPr sz="2400" kern="1200">
-                <a:solidFill>
-                  <a:schemeClr val="tx1"/>
-                </a:solidFill>
-                <a:latin typeface="+mn-lt"/>
-                <a:ea typeface="+mn-ea"/>
-                <a:cs typeface="+mn-cs"/>
-              </a:defRPr>
-            </a:lvl1pPr>
-            <a:lvl2pPr marL="457200" indent="0" algn="ctr" defTabSz="914400" rtl="0" eaLnBrk="1" latinLnBrk="0" hangingPunct="1">
-              <a:lnSpc>
-                <a:spcPct val="90000"/>
-              </a:lnSpc>
-              <a:spcBef>
-                <a:spcPts val="500"/>
-              </a:spcBef>
-              <a:buFont typeface="Arial" panose="020B0604020202020204" pitchFamily="34" charset="0"/>
-              <a:buNone/>
-              <a:defRPr sz="2000" kern="1200">
-                <a:solidFill>
-                  <a:schemeClr val="tx1"/>
-                </a:solidFill>
-                <a:latin typeface="+mn-lt"/>
-                <a:ea typeface="+mn-ea"/>
-                <a:cs typeface="+mn-cs"/>
-              </a:defRPr>
-            </a:lvl2pPr>
-            <a:lvl3pPr marL="914400" indent="0" algn="ctr" defTabSz="914400" rtl="0" eaLnBrk="1" latinLnBrk="0" hangingPunct="1">
-              <a:lnSpc>
-                <a:spcPct val="90000"/>
-              </a:lnSpc>
-              <a:spcBef>
-                <a:spcPts val="500"/>
-              </a:spcBef>
-              <a:buFont typeface="Arial" panose="020B0604020202020204" pitchFamily="34" charset="0"/>
-              <a:buNone/>
-              <a:defRPr sz="1800" kern="1200">
-                <a:solidFill>
-                  <a:schemeClr val="tx1"/>
-                </a:solidFill>
-                <a:latin typeface="+mn-lt"/>
-                <a:ea typeface="+mn-ea"/>
-                <a:cs typeface="+mn-cs"/>
-              </a:defRPr>
-            </a:lvl3pPr>
-            <a:lvl4pPr marL="1371600" indent="0" algn="ctr" defTabSz="914400" rtl="0" eaLnBrk="1" latinLnBrk="0" hangingPunct="1">
-              <a:lnSpc>
-                <a:spcPct val="90000"/>
-              </a:lnSpc>
-              <a:spcBef>
-                <a:spcPts val="500"/>
-              </a:spcBef>
-              <a:buFont typeface="Arial" panose="020B0604020202020204" pitchFamily="34" charset="0"/>
-              <a:buNone/>
-              <a:defRPr sz="1600" kern="1200">
-                <a:solidFill>
-                  <a:schemeClr val="tx1"/>
-                </a:solidFill>
-                <a:latin typeface="+mn-lt"/>
-                <a:ea typeface="+mn-ea"/>
-                <a:cs typeface="+mn-cs"/>
-              </a:defRPr>
-            </a:lvl4pPr>
-            <a:lvl5pPr marL="1828800" indent="0" algn="ctr" defTabSz="914400" rtl="0" eaLnBrk="1" latinLnBrk="0" hangingPunct="1">
-              <a:lnSpc>
-                <a:spcPct val="90000"/>
-              </a:lnSpc>
-              <a:spcBef>
-                <a:spcPts val="500"/>
-              </a:spcBef>
-              <a:buFont typeface="Arial" panose="020B0604020202020204" pitchFamily="34" charset="0"/>
-              <a:buNone/>
-              <a:defRPr sz="1600" kern="1200">
-                <a:solidFill>
-                  <a:schemeClr val="tx1"/>
-                </a:solidFill>
-                <a:latin typeface="+mn-lt"/>
-                <a:ea typeface="+mn-ea"/>
-                <a:cs typeface="+mn-cs"/>
-              </a:defRPr>
-            </a:lvl5pPr>
-            <a:lvl6pPr marL="2286000" indent="0" algn="ctr" defTabSz="914400" rtl="0" eaLnBrk="1" latinLnBrk="0" hangingPunct="1">
-              <a:lnSpc>
-                <a:spcPct val="90000"/>
-              </a:lnSpc>
-              <a:spcBef>
-                <a:spcPts val="500"/>
-              </a:spcBef>
-              <a:buFont typeface="Arial" panose="020B0604020202020204" pitchFamily="34" charset="0"/>
-              <a:buNone/>
-              <a:defRPr sz="1600" kern="1200">
-                <a:solidFill>
-                  <a:schemeClr val="tx1"/>
-                </a:solidFill>
-                <a:latin typeface="+mn-lt"/>
-                <a:ea typeface="+mn-ea"/>
-                <a:cs typeface="+mn-cs"/>
-              </a:defRPr>
-            </a:lvl6pPr>
-            <a:lvl7pPr marL="2743200" indent="0" algn="ctr" defTabSz="914400" rtl="0" eaLnBrk="1" latinLnBrk="0" hangingPunct="1">
-              <a:lnSpc>
-                <a:spcPct val="90000"/>
-              </a:lnSpc>
-              <a:spcBef>
-                <a:spcPts val="500"/>
-              </a:spcBef>
-              <a:buFont typeface="Arial" panose="020B0604020202020204" pitchFamily="34" charset="0"/>
-              <a:buNone/>
-              <a:defRPr sz="1600" kern="1200">
-                <a:solidFill>
-                  <a:schemeClr val="tx1"/>
-                </a:solidFill>
-                <a:latin typeface="+mn-lt"/>
-                <a:ea typeface="+mn-ea"/>
-                <a:cs typeface="+mn-cs"/>
-              </a:defRPr>
-            </a:lvl7pPr>
-            <a:lvl8pPr marL="3200400" indent="0" algn="ctr" defTabSz="914400" rtl="0" eaLnBrk="1" latinLnBrk="0" hangingPunct="1">
-              <a:lnSpc>
-                <a:spcPct val="90000"/>
-              </a:lnSpc>
-              <a:spcBef>
-                <a:spcPts val="500"/>
-              </a:spcBef>
-              <a:buFont typeface="Arial" panose="020B0604020202020204" pitchFamily="34" charset="0"/>
-              <a:buNone/>
-              <a:defRPr sz="1600" kern="1200">
-                <a:solidFill>
-                  <a:schemeClr val="tx1"/>
-                </a:solidFill>
-                <a:latin typeface="+mn-lt"/>
-                <a:ea typeface="+mn-ea"/>
-                <a:cs typeface="+mn-cs"/>
-              </a:defRPr>
-            </a:lvl8pPr>
-            <a:lvl9pPr marL="3657600" indent="0" algn="ctr" defTabSz="914400" rtl="0" eaLnBrk="1" latinLnBrk="0" hangingPunct="1">
-              <a:lnSpc>
-                <a:spcPct val="90000"/>
-              </a:lnSpc>
-              <a:spcBef>
-                <a:spcPts val="500"/>
-              </a:spcBef>
-              <a:buFont typeface="Arial" panose="020B0604020202020204" pitchFamily="34" charset="0"/>
-              <a:buNone/>
-              <a:defRPr sz="1600" kern="1200">
-                <a:solidFill>
-                  <a:schemeClr val="tx1"/>
-                </a:solidFill>
-                <a:latin typeface="+mn-lt"/>
-                <a:ea typeface="+mn-ea"/>
-                <a:cs typeface="+mn-cs"/>
-              </a:defRPr>
-            </a:lvl9pPr>
-          </a:lstStyle>
-          <a:p>
-            <a:r>
-              <a:rPr lang="fr-FR" b="1" dirty="0"/>
-              <a:t>Raphaël Guy</a:t>
-            </a:r>
-          </a:p>
-        </p:txBody>
-      </p:sp>
-      <p:sp>
-        <p:nvSpPr>
-          <p:cNvPr id="25" name="Sous-titre 19">
-            <a:extLst>
-              <a:ext uri="{FF2B5EF4-FFF2-40B4-BE49-F238E27FC236}">
-                <a16:creationId xmlns:a16="http://schemas.microsoft.com/office/drawing/2014/main" id="{BA926F7D-99CD-4681-8F4E-01D62A58E841}"/>
-              </a:ext>
-            </a:extLst>
-          </p:cNvPr>
-          <p:cNvSpPr txBox="1">
-            <a:spLocks/>
-          </p:cNvSpPr>
-          <p:nvPr/>
-        </p:nvSpPr>
-        <p:spPr>
-          <a:xfrm>
-            <a:off x="1352177" y="2715150"/>
-            <a:ext cx="2458456" cy="616027"/>
-          </a:xfrm>
-          <a:prstGeom prst="rect">
-            <a:avLst/>
-          </a:prstGeom>
-        </p:spPr>
-        <p:txBody>
-          <a:bodyPr vert="horz" lIns="91440" tIns="45720" rIns="91440" bIns="45720" rtlCol="0">
-            <a:normAutofit/>
-          </a:bodyPr>
-          <a:lstStyle>
-            <a:lvl1pPr marL="0" indent="0" algn="ctr" defTabSz="914400" rtl="0" eaLnBrk="1" latinLnBrk="0" hangingPunct="1">
-              <a:lnSpc>
-                <a:spcPct val="90000"/>
-              </a:lnSpc>
-              <a:spcBef>
-                <a:spcPts val="1000"/>
-              </a:spcBef>
-              <a:buFont typeface="Arial" panose="020B0604020202020204" pitchFamily="34" charset="0"/>
-              <a:buNone/>
-              <a:defRPr sz="2400" kern="1200">
-                <a:solidFill>
-                  <a:schemeClr val="tx1"/>
-                </a:solidFill>
-                <a:latin typeface="+mn-lt"/>
-                <a:ea typeface="+mn-ea"/>
-                <a:cs typeface="+mn-cs"/>
-              </a:defRPr>
-            </a:lvl1pPr>
-            <a:lvl2pPr marL="457200" indent="0" algn="ctr" defTabSz="914400" rtl="0" eaLnBrk="1" latinLnBrk="0" hangingPunct="1">
-              <a:lnSpc>
-                <a:spcPct val="90000"/>
-              </a:lnSpc>
-              <a:spcBef>
-                <a:spcPts val="500"/>
-              </a:spcBef>
-              <a:buFont typeface="Arial" panose="020B0604020202020204" pitchFamily="34" charset="0"/>
-              <a:buNone/>
-              <a:defRPr sz="2000" kern="1200">
-                <a:solidFill>
-                  <a:schemeClr val="tx1"/>
-                </a:solidFill>
-                <a:latin typeface="+mn-lt"/>
-                <a:ea typeface="+mn-ea"/>
-                <a:cs typeface="+mn-cs"/>
-              </a:defRPr>
-            </a:lvl2pPr>
-            <a:lvl3pPr marL="914400" indent="0" algn="ctr" defTabSz="914400" rtl="0" eaLnBrk="1" latinLnBrk="0" hangingPunct="1">
-              <a:lnSpc>
-                <a:spcPct val="90000"/>
-              </a:lnSpc>
-              <a:spcBef>
-                <a:spcPts val="500"/>
-              </a:spcBef>
-              <a:buFont typeface="Arial" panose="020B0604020202020204" pitchFamily="34" charset="0"/>
-              <a:buNone/>
-              <a:defRPr sz="1800" kern="1200">
-                <a:solidFill>
-                  <a:schemeClr val="tx1"/>
-                </a:solidFill>
-                <a:latin typeface="+mn-lt"/>
-                <a:ea typeface="+mn-ea"/>
-                <a:cs typeface="+mn-cs"/>
-              </a:defRPr>
-            </a:lvl3pPr>
-            <a:lvl4pPr marL="1371600" indent="0" algn="ctr" defTabSz="914400" rtl="0" eaLnBrk="1" latinLnBrk="0" hangingPunct="1">
-              <a:lnSpc>
-                <a:spcPct val="90000"/>
-              </a:lnSpc>
-              <a:spcBef>
-                <a:spcPts val="500"/>
-              </a:spcBef>
-              <a:buFont typeface="Arial" panose="020B0604020202020204" pitchFamily="34" charset="0"/>
-              <a:buNone/>
-              <a:defRPr sz="1600" kern="1200">
-                <a:solidFill>
-                  <a:schemeClr val="tx1"/>
-                </a:solidFill>
-                <a:latin typeface="+mn-lt"/>
-                <a:ea typeface="+mn-ea"/>
-                <a:cs typeface="+mn-cs"/>
-              </a:defRPr>
-            </a:lvl4pPr>
-            <a:lvl5pPr marL="1828800" indent="0" algn="ctr" defTabSz="914400" rtl="0" eaLnBrk="1" latinLnBrk="0" hangingPunct="1">
-              <a:lnSpc>
-                <a:spcPct val="90000"/>
-              </a:lnSpc>
-              <a:spcBef>
-                <a:spcPts val="500"/>
-              </a:spcBef>
-              <a:buFont typeface="Arial" panose="020B0604020202020204" pitchFamily="34" charset="0"/>
-              <a:buNone/>
-              <a:defRPr sz="1600" kern="1200">
-                <a:solidFill>
-                  <a:schemeClr val="tx1"/>
-                </a:solidFill>
-                <a:latin typeface="+mn-lt"/>
-                <a:ea typeface="+mn-ea"/>
-                <a:cs typeface="+mn-cs"/>
-              </a:defRPr>
-            </a:lvl5pPr>
-            <a:lvl6pPr marL="2286000" indent="0" algn="ctr" defTabSz="914400" rtl="0" eaLnBrk="1" latinLnBrk="0" hangingPunct="1">
-              <a:lnSpc>
-                <a:spcPct val="90000"/>
-              </a:lnSpc>
-              <a:spcBef>
-                <a:spcPts val="500"/>
-              </a:spcBef>
-              <a:buFont typeface="Arial" panose="020B0604020202020204" pitchFamily="34" charset="0"/>
-              <a:buNone/>
-              <a:defRPr sz="1600" kern="1200">
-                <a:solidFill>
-                  <a:schemeClr val="tx1"/>
-                </a:solidFill>
-                <a:latin typeface="+mn-lt"/>
-                <a:ea typeface="+mn-ea"/>
-                <a:cs typeface="+mn-cs"/>
-              </a:defRPr>
-            </a:lvl6pPr>
-            <a:lvl7pPr marL="2743200" indent="0" algn="ctr" defTabSz="914400" rtl="0" eaLnBrk="1" latinLnBrk="0" hangingPunct="1">
-              <a:lnSpc>
-                <a:spcPct val="90000"/>
-              </a:lnSpc>
-              <a:spcBef>
-                <a:spcPts val="500"/>
-              </a:spcBef>
-              <a:buFont typeface="Arial" panose="020B0604020202020204" pitchFamily="34" charset="0"/>
-              <a:buNone/>
-              <a:defRPr sz="1600" kern="1200">
-                <a:solidFill>
-                  <a:schemeClr val="tx1"/>
-                </a:solidFill>
-                <a:latin typeface="+mn-lt"/>
-                <a:ea typeface="+mn-ea"/>
-                <a:cs typeface="+mn-cs"/>
-              </a:defRPr>
-            </a:lvl7pPr>
-            <a:lvl8pPr marL="3200400" indent="0" algn="ctr" defTabSz="914400" rtl="0" eaLnBrk="1" latinLnBrk="0" hangingPunct="1">
-              <a:lnSpc>
-                <a:spcPct val="90000"/>
-              </a:lnSpc>
-              <a:spcBef>
-                <a:spcPts val="500"/>
-              </a:spcBef>
-              <a:buFont typeface="Arial" panose="020B0604020202020204" pitchFamily="34" charset="0"/>
-              <a:buNone/>
-              <a:defRPr sz="1600" kern="1200">
-                <a:solidFill>
-                  <a:schemeClr val="tx1"/>
-                </a:solidFill>
-                <a:latin typeface="+mn-lt"/>
-                <a:ea typeface="+mn-ea"/>
-                <a:cs typeface="+mn-cs"/>
-              </a:defRPr>
-            </a:lvl8pPr>
-            <a:lvl9pPr marL="3657600" indent="0" algn="ctr" defTabSz="914400" rtl="0" eaLnBrk="1" latinLnBrk="0" hangingPunct="1">
-              <a:lnSpc>
-                <a:spcPct val="90000"/>
-              </a:lnSpc>
-              <a:spcBef>
-                <a:spcPts val="500"/>
-              </a:spcBef>
-              <a:buFont typeface="Arial" panose="020B0604020202020204" pitchFamily="34" charset="0"/>
-              <a:buNone/>
-              <a:defRPr sz="1600" kern="1200">
-                <a:solidFill>
-                  <a:schemeClr val="tx1"/>
-                </a:solidFill>
-                <a:latin typeface="+mn-lt"/>
-                <a:ea typeface="+mn-ea"/>
-                <a:cs typeface="+mn-cs"/>
-              </a:defRPr>
-            </a:lvl9pPr>
-          </a:lstStyle>
-          <a:p>
-            <a:r>
-              <a:rPr lang="fr-FR" b="1" dirty="0"/>
-              <a:t>Kellian CIPIERRE</a:t>
-            </a:r>
-          </a:p>
-        </p:txBody>
-      </p:sp>
-    </p:spTree>
-    <p:extLst>
-      <p:ext uri="{BB962C8B-B14F-4D97-AF65-F5344CB8AC3E}">
-        <p14:creationId xmlns:p14="http://schemas.microsoft.com/office/powerpoint/2010/main" val="2227109878"/>
-      </p:ext>
-    </p:extLst>
-  </p:cSld>
-  <p:clrMapOvr>
-    <a:masterClrMapping/>
-  </p:clrMapOvr>
-  <mc:AlternateContent xmlns:mc="http://schemas.openxmlformats.org/markup-compatibility/2006">
-    <mc:Choice xmlns:p14="http://schemas.microsoft.com/office/powerpoint/2010/main" Requires="p14">
-      <p:transition spd="med" p14:dur="700">
-        <p:fade/>
-      </p:transition>
-    </mc:Choice>
-    <mc:Fallback>
-      <p:transition spd="med">
-        <p:fade/>
-      </p:transition>
-    </mc:Fallback>
-  </mc:AlternateContent>
-</p:sld>
-</file>
-
-<file path=ppt/slides/slide2.xml><?xml version="1.0" encoding="utf-8"?>
-<p:sld xmlns:a="http://schemas.openxmlformats.org/drawingml/2006/main" xmlns:r="http://schemas.openxmlformats.org/officeDocument/2006/relationships" xmlns:p="http://schemas.openxmlformats.org/presentationml/2006/main">
-  <p:cSld>
-    <p:spTree>
-      <p:nvGrpSpPr>
-        <p:cNvPr id="1" name=""/>
-        <p:cNvGrpSpPr/>
-        <p:nvPr/>
-      </p:nvGrpSpPr>
-      <p:grpSpPr>
-        <a:xfrm>
-          <a:off x="0" y="0"/>
-          <a:ext cx="0" cy="0"/>
-          <a:chOff x="0" y="0"/>
-          <a:chExt cx="0" cy="0"/>
-        </a:xfrm>
-      </p:grpSpPr>
-      <p:pic>
-        <p:nvPicPr>
-          <p:cNvPr id="17" name="Image 16" descr="Une image contenant bâtiment, cité, grand, assis&#10;&#10;Description générée automatiquement">
-            <a:extLst>
-              <a:ext uri="{FF2B5EF4-FFF2-40B4-BE49-F238E27FC236}">
-                <a16:creationId xmlns:a16="http://schemas.microsoft.com/office/drawing/2014/main" id="{6CF04101-E0D4-4105-A8F6-73217A3E211B}"/>
-              </a:ext>
-            </a:extLst>
-          </p:cNvPr>
-          <p:cNvPicPr>
-            <a:picLocks noChangeAspect="1"/>
-          </p:cNvPicPr>
-          <p:nvPr/>
-        </p:nvPicPr>
-        <p:blipFill>
-          <a:blip r:embed="rId2">
-            <a:extLst>
-              <a:ext uri="{28A0092B-C50C-407E-A947-70E740481C1C}">
-                <a14:useLocalDpi xmlns:a14="http://schemas.microsoft.com/office/drawing/2010/main" val="0"/>
-              </a:ext>
-            </a:extLst>
-          </a:blip>
-          <a:stretch>
-            <a:fillRect/>
-          </a:stretch>
-        </p:blipFill>
-        <p:spPr>
-          <a:xfrm>
-            <a:off x="0" y="0"/>
-            <a:ext cx="12192000" cy="6868732"/>
-          </a:xfrm>
-          <a:prstGeom prst="rect">
-            <a:avLst/>
-          </a:prstGeom>
-        </p:spPr>
-      </p:pic>
-      <p:sp>
-        <p:nvSpPr>
-          <p:cNvPr id="2" name="Titre 1">
-            <a:extLst>
-              <a:ext uri="{FF2B5EF4-FFF2-40B4-BE49-F238E27FC236}">
-                <a16:creationId xmlns:a16="http://schemas.microsoft.com/office/drawing/2014/main" id="{461C7968-4A46-4689-AB1E-51CA29617B56}"/>
-              </a:ext>
-            </a:extLst>
-          </p:cNvPr>
-          <p:cNvSpPr>
-            <a:spLocks noGrp="1"/>
-          </p:cNvSpPr>
-          <p:nvPr>
-            <p:ph type="ctrTitle"/>
-          </p:nvPr>
-        </p:nvSpPr>
-        <p:spPr>
-          <a:xfrm>
-            <a:off x="0" y="106869"/>
-            <a:ext cx="4257379" cy="1585200"/>
-          </a:xfrm>
-        </p:spPr>
-        <p:txBody>
-          <a:bodyPr>
-            <a:normAutofit/>
-          </a:bodyPr>
-          <a:lstStyle/>
-          <a:p>
-            <a:r>
-              <a:rPr lang="fr-FR" sz="5400" b="1" dirty="0">
-                <a:solidFill>
-                  <a:srgbClr val="FF0000"/>
-                </a:solidFill>
-                <a:latin typeface="+mn-lt"/>
-                <a:cs typeface="Times New Roman" panose="02020603050405020304" pitchFamily="18" charset="0"/>
-              </a:rPr>
-              <a:t>3D Game</a:t>
-            </a:r>
-            <a:br>
-              <a:rPr lang="fr-FR" sz="5400" b="1" dirty="0">
-                <a:solidFill>
-                  <a:srgbClr val="FF0000"/>
-                </a:solidFill>
-                <a:latin typeface="+mn-lt"/>
-                <a:cs typeface="Times New Roman" panose="02020603050405020304" pitchFamily="18" charset="0"/>
-              </a:rPr>
-            </a:br>
-            <a:r>
-              <a:rPr lang="fr-FR" sz="5400" b="1" dirty="0">
-                <a:solidFill>
-                  <a:srgbClr val="FF0000"/>
-                </a:solidFill>
-                <a:latin typeface="+mn-lt"/>
-                <a:cs typeface="Times New Roman" panose="02020603050405020304" pitchFamily="18" charset="0"/>
-              </a:rPr>
-              <a:t>Beat </a:t>
-            </a:r>
-            <a:r>
-              <a:rPr lang="fr-FR" sz="5400" b="1" dirty="0" err="1">
-                <a:solidFill>
-                  <a:srgbClr val="FF0000"/>
-                </a:solidFill>
-                <a:latin typeface="+mn-lt"/>
-                <a:cs typeface="Times New Roman" panose="02020603050405020304" pitchFamily="18" charset="0"/>
-              </a:rPr>
-              <a:t>Them</a:t>
-            </a:r>
-            <a:r>
-              <a:rPr lang="fr-FR" sz="5400" b="1" dirty="0">
-                <a:solidFill>
-                  <a:srgbClr val="FF0000"/>
-                </a:solidFill>
-                <a:latin typeface="+mn-lt"/>
-                <a:cs typeface="Times New Roman" panose="02020603050405020304" pitchFamily="18" charset="0"/>
-              </a:rPr>
-              <a:t> All</a:t>
-            </a:r>
-          </a:p>
-        </p:txBody>
-      </p:sp>
-      <p:pic>
-        <p:nvPicPr>
-          <p:cNvPr id="6" name="Image 5" descr="Une image contenant sombre, allumé, ordinateur, assis&#10;&#10;Description générée automatiquement">
-            <a:extLst>
-              <a:ext uri="{FF2B5EF4-FFF2-40B4-BE49-F238E27FC236}">
-                <a16:creationId xmlns:a16="http://schemas.microsoft.com/office/drawing/2014/main" id="{242F028D-F426-4A1D-A3E8-06B1E5B1BEC9}"/>
-              </a:ext>
-            </a:extLst>
-          </p:cNvPr>
-          <p:cNvPicPr>
-            <a:picLocks noChangeAspect="1"/>
-          </p:cNvPicPr>
-          <p:nvPr/>
-        </p:nvPicPr>
-        <p:blipFill>
-          <a:blip r:embed="rId3">
-            <a:extLst>
-              <a:ext uri="{28A0092B-C50C-407E-A947-70E740481C1C}">
-                <a14:useLocalDpi xmlns:a14="http://schemas.microsoft.com/office/drawing/2010/main" val="0"/>
-              </a:ext>
-            </a:extLst>
-          </a:blip>
-          <a:stretch>
-            <a:fillRect/>
-          </a:stretch>
-        </p:blipFill>
-        <p:spPr>
-          <a:xfrm>
-            <a:off x="7287208" y="242207"/>
-            <a:ext cx="4430486" cy="1609743"/>
-          </a:xfrm>
-          <a:prstGeom prst="rect">
-            <a:avLst/>
-          </a:prstGeom>
-        </p:spPr>
-      </p:pic>
-    </p:spTree>
-    <p:extLst>
-      <p:ext uri="{BB962C8B-B14F-4D97-AF65-F5344CB8AC3E}">
-        <p14:creationId xmlns:p14="http://schemas.microsoft.com/office/powerpoint/2010/main" val="3994157654"/>
-      </p:ext>
-    </p:extLst>
-  </p:cSld>
-  <p:clrMapOvr>
-    <a:masterClrMapping/>
-  </p:clrMapOvr>
-  <mc:AlternateContent xmlns:mc="http://schemas.openxmlformats.org/markup-compatibility/2006">
-    <mc:Choice xmlns:p159="http://schemas.microsoft.com/office/powerpoint/2015/09/main" Requires="p159">
-      <p:transition xmlns:p14="http://schemas.microsoft.com/office/powerpoint/2010/main" spd="slow" p14:dur="2000">
-        <p159:morph option="byObject"/>
-      </p:transition>
-    </mc:Choice>
-    <mc:Fallback>
-      <p:transition spd="slow">
-        <p:fade/>
-      </p:transition>
-    </mc:Fallback>
-  </mc:AlternateContent>
-</p:sld>
-</file>
-
-<file path=ppt/slides/slide3.xml><?xml version="1.0" encoding="utf-8"?>
-<p:sld xmlns:a="http://schemas.openxmlformats.org/drawingml/2006/main" xmlns:r="http://schemas.openxmlformats.org/officeDocument/2006/relationships" xmlns:p="http://schemas.openxmlformats.org/presentationml/2006/main">
-  <p:cSld>
-    <p:bg>
-      <p:bgPr>
-        <a:solidFill>
-          <a:schemeClr val="bg1"/>
-        </a:solidFill>
-        <a:effectLst/>
-      </p:bgPr>
-    </p:bg>
-    <p:spTree>
-      <p:nvGrpSpPr>
-        <p:cNvPr id="1" name=""/>
-        <p:cNvGrpSpPr/>
-        <p:nvPr/>
-      </p:nvGrpSpPr>
-      <p:grpSpPr>
-        <a:xfrm>
-          <a:off x="0" y="0"/>
-          <a:ext cx="0" cy="0"/>
-          <a:chOff x="0" y="0"/>
-          <a:chExt cx="0" cy="0"/>
-        </a:xfrm>
-      </p:grpSpPr>
-      <p:pic>
-        <p:nvPicPr>
-          <p:cNvPr id="14" name="Image 13" descr="Une image contenant capture d’écran, ordinateur&#10;&#10;Description générée automatiquement">
-            <a:extLst>
-              <a:ext uri="{FF2B5EF4-FFF2-40B4-BE49-F238E27FC236}">
-                <a16:creationId xmlns:a16="http://schemas.microsoft.com/office/drawing/2014/main" id="{C195D4D0-27DC-4CA5-8AF6-42E817F86C32}"/>
-              </a:ext>
-            </a:extLst>
-          </p:cNvPr>
-          <p:cNvPicPr>
-            <a:picLocks noChangeAspect="1"/>
-          </p:cNvPicPr>
-          <p:nvPr/>
-        </p:nvPicPr>
-        <p:blipFill rotWithShape="1">
-          <a:blip r:embed="rId2">
-            <a:extLst>
-              <a:ext uri="{28A0092B-C50C-407E-A947-70E740481C1C}">
-                <a14:useLocalDpi xmlns:a14="http://schemas.microsoft.com/office/drawing/2010/main" val="0"/>
-              </a:ext>
-            </a:extLst>
-          </a:blip>
-          <a:srcRect l="8339" r="24994"/>
-          <a:stretch/>
-        </p:blipFill>
-        <p:spPr>
-          <a:xfrm>
-            <a:off x="20" y="10"/>
-            <a:ext cx="6095980" cy="6857990"/>
-          </a:xfrm>
-          <a:prstGeom prst="rect">
-            <a:avLst/>
-          </a:prstGeom>
-        </p:spPr>
-      </p:pic>
-      <p:pic>
-        <p:nvPicPr>
-          <p:cNvPr id="9" name="Image 8" descr="Une image contenant ordinateur, dessin, table&#10;&#10;Description générée automatiquement">
-            <a:extLst>
-              <a:ext uri="{FF2B5EF4-FFF2-40B4-BE49-F238E27FC236}">
-                <a16:creationId xmlns:a16="http://schemas.microsoft.com/office/drawing/2014/main" id="{FC59685C-EF80-4E38-AAB2-101474804714}"/>
-              </a:ext>
-            </a:extLst>
-          </p:cNvPr>
-          <p:cNvPicPr>
-            <a:picLocks noChangeAspect="1"/>
-          </p:cNvPicPr>
-          <p:nvPr/>
-        </p:nvPicPr>
-        <p:blipFill rotWithShape="1">
-          <a:blip r:embed="rId3">
-            <a:extLst>
-              <a:ext uri="{28A0092B-C50C-407E-A947-70E740481C1C}">
-                <a14:useLocalDpi xmlns:a14="http://schemas.microsoft.com/office/drawing/2010/main" val="0"/>
-              </a:ext>
-            </a:extLst>
-          </a:blip>
-          <a:srcRect l="21659" r="28341"/>
-          <a:stretch/>
-        </p:blipFill>
-        <p:spPr>
-          <a:xfrm>
-            <a:off x="6096000" y="10"/>
-            <a:ext cx="6096000" cy="6857990"/>
-          </a:xfrm>
-          <a:prstGeom prst="rect">
-            <a:avLst/>
-          </a:prstGeom>
-        </p:spPr>
-      </p:pic>
-    </p:spTree>
-    <p:extLst>
-      <p:ext uri="{BB962C8B-B14F-4D97-AF65-F5344CB8AC3E}">
-        <p14:creationId xmlns:p14="http://schemas.microsoft.com/office/powerpoint/2010/main" val="36303002"/>
-      </p:ext>
-    </p:extLst>
-  </p:cSld>
-  <p:clrMapOvr>
-    <a:masterClrMapping/>
-  </p:clrMapOvr>
-  <mc:AlternateContent xmlns:mc="http://schemas.openxmlformats.org/markup-compatibility/2006">
-    <mc:Choice xmlns:p14="http://schemas.microsoft.com/office/powerpoint/2010/main" Requires="p14">
-      <p:transition spd="med" p14:dur="700">
-        <p:fade/>
-      </p:transition>
-    </mc:Choice>
-    <mc:Fallback>
-      <p:transition spd="med">
-        <p:fade/>
-      </p:transition>
-    </mc:Fallback>
-  </mc:AlternateContent>
-</p:sld>
-</file>
-
-<file path=ppt/slides/slide4.xml><?xml version="1.0" encoding="utf-8"?>
-<p:sld xmlns:a="http://schemas.openxmlformats.org/drawingml/2006/main" xmlns:r="http://schemas.openxmlformats.org/officeDocument/2006/relationships" xmlns:p="http://schemas.openxmlformats.org/presentationml/2006/main">
-  <p:cSld>
-    <p:bg>
-      <p:bgPr>
-        <a:solidFill>
-          <a:schemeClr val="bg1"/>
-        </a:solidFill>
-        <a:effectLst/>
-      </p:bgPr>
-    </p:bg>
-    <p:spTree>
-      <p:nvGrpSpPr>
-        <p:cNvPr id="1" name=""/>
-        <p:cNvGrpSpPr/>
-        <p:nvPr/>
-      </p:nvGrpSpPr>
-      <p:grpSpPr>
-        <a:xfrm>
-          <a:off x="0" y="0"/>
-          <a:ext cx="0" cy="0"/>
-          <a:chOff x="0" y="0"/>
-          <a:chExt cx="0" cy="0"/>
-        </a:xfrm>
-      </p:grpSpPr>
-      <p:pic>
-        <p:nvPicPr>
-          <p:cNvPr id="4" name="Image 3" descr="Une image contenant horloge, objet, signe&#10;&#10;Description générée automatiquement">
-            <a:extLst>
-              <a:ext uri="{FF2B5EF4-FFF2-40B4-BE49-F238E27FC236}">
-                <a16:creationId xmlns:a16="http://schemas.microsoft.com/office/drawing/2014/main" id="{DB4BCADF-8779-42E3-B6A2-546CE125250D}"/>
-              </a:ext>
-            </a:extLst>
-          </p:cNvPr>
-          <p:cNvPicPr>
-            <a:picLocks noChangeAspect="1"/>
-          </p:cNvPicPr>
-          <p:nvPr/>
-        </p:nvPicPr>
-        <p:blipFill rotWithShape="1">
-          <a:blip r:embed="rId2">
-            <a:extLst>
-              <a:ext uri="{28A0092B-C50C-407E-A947-70E740481C1C}">
-                <a14:useLocalDpi xmlns:a14="http://schemas.microsoft.com/office/drawing/2010/main" val="0"/>
-              </a:ext>
-            </a:extLst>
-          </a:blip>
-          <a:srcRect l="26463" r="24426" b="1"/>
-          <a:stretch/>
-        </p:blipFill>
-        <p:spPr>
-          <a:xfrm>
-            <a:off x="20" y="10"/>
-            <a:ext cx="6095980" cy="6857990"/>
-          </a:xfrm>
-          <a:prstGeom prst="rect">
-            <a:avLst/>
-          </a:prstGeom>
-        </p:spPr>
-      </p:pic>
-      <p:pic>
-        <p:nvPicPr>
-          <p:cNvPr id="6" name="Image 5" descr="Une image contenant horloge, réfrigérateur&#10;&#10;Description générée automatiquement">
-            <a:extLst>
-              <a:ext uri="{FF2B5EF4-FFF2-40B4-BE49-F238E27FC236}">
-                <a16:creationId xmlns:a16="http://schemas.microsoft.com/office/drawing/2014/main" id="{BC3CBA4B-3272-41CB-847A-6F5EEFAC5C27}"/>
-              </a:ext>
-            </a:extLst>
-          </p:cNvPr>
-          <p:cNvPicPr>
-            <a:picLocks noChangeAspect="1"/>
-          </p:cNvPicPr>
-          <p:nvPr/>
-        </p:nvPicPr>
-        <p:blipFill rotWithShape="1">
-          <a:blip r:embed="rId3">
-            <a:extLst>
-              <a:ext uri="{28A0092B-C50C-407E-A947-70E740481C1C}">
-                <a14:useLocalDpi xmlns:a14="http://schemas.microsoft.com/office/drawing/2010/main" val="0"/>
-              </a:ext>
-            </a:extLst>
-          </a:blip>
-          <a:srcRect l="3069" r="8042"/>
-          <a:stretch/>
-        </p:blipFill>
-        <p:spPr>
-          <a:xfrm>
-            <a:off x="6096000" y="10"/>
-            <a:ext cx="6096000" cy="6857990"/>
-          </a:xfrm>
-          <a:prstGeom prst="rect">
-            <a:avLst/>
-          </a:prstGeom>
-        </p:spPr>
-      </p:pic>
-    </p:spTree>
-    <p:extLst>
-      <p:ext uri="{BB962C8B-B14F-4D97-AF65-F5344CB8AC3E}">
-        <p14:creationId xmlns:p14="http://schemas.microsoft.com/office/powerpoint/2010/main" val="2346671218"/>
-      </p:ext>
-    </p:extLst>
-  </p:cSld>
-  <p:clrMapOvr>
-    <a:masterClrMapping/>
-  </p:clrMapOvr>
-  <mc:AlternateContent xmlns:mc="http://schemas.openxmlformats.org/markup-compatibility/2006">
-    <mc:Choice xmlns:p14="http://schemas.microsoft.com/office/powerpoint/2010/main" Requires="p14">
-      <p:transition spd="med" p14:dur="700">
-        <p:fade/>
-      </p:transition>
-    </mc:Choice>
-    <mc:Fallback>
-      <p:transition spd="med">
-        <p:fade/>
-      </p:transition>
-    </mc:Fallback>
-  </mc:AlternateContent>
-</p:sld>
-</file>
-
-<file path=ppt/slides/slide5.xml><?xml version="1.0" encoding="utf-8"?>
-<p:sld xmlns:a="http://schemas.openxmlformats.org/drawingml/2006/main" xmlns:r="http://schemas.openxmlformats.org/officeDocument/2006/relationships" xmlns:p="http://schemas.openxmlformats.org/presentationml/2006/main">
-  <p:cSld>
-    <p:bg>
-      <p:bgPr>
-        <a:solidFill>
-          <a:schemeClr val="bg1"/>
-        </a:solidFill>
-        <a:effectLst/>
-      </p:bgPr>
-    </p:bg>
-    <p:spTree>
-      <p:nvGrpSpPr>
-        <p:cNvPr id="1" name=""/>
-        <p:cNvGrpSpPr/>
-        <p:nvPr/>
-      </p:nvGrpSpPr>
-      <p:grpSpPr>
-        <a:xfrm>
-          <a:off x="0" y="0"/>
-          <a:ext cx="0" cy="0"/>
-          <a:chOff x="0" y="0"/>
-          <a:chExt cx="0" cy="0"/>
-        </a:xfrm>
-      </p:grpSpPr>
-      <p:pic>
-        <p:nvPicPr>
-          <p:cNvPr id="3" name="Image 2" descr="Une image contenant jouet&#10;&#10;Description générée automatiquement">
-            <a:extLst>
-              <a:ext uri="{FF2B5EF4-FFF2-40B4-BE49-F238E27FC236}">
-                <a16:creationId xmlns:a16="http://schemas.microsoft.com/office/drawing/2014/main" id="{2970CEC3-70F4-464E-9693-D42BB3C4B2A3}"/>
-              </a:ext>
-            </a:extLst>
-          </p:cNvPr>
-          <p:cNvPicPr>
-            <a:picLocks noChangeAspect="1"/>
-          </p:cNvPicPr>
-          <p:nvPr/>
-        </p:nvPicPr>
-        <p:blipFill rotWithShape="1">
-          <a:blip r:embed="rId2">
-            <a:extLst>
-              <a:ext uri="{28A0092B-C50C-407E-A947-70E740481C1C}">
-                <a14:useLocalDpi xmlns:a14="http://schemas.microsoft.com/office/drawing/2010/main" val="0"/>
-              </a:ext>
-            </a:extLst>
-          </a:blip>
-          <a:srcRect t="5981" b="25001"/>
-          <a:stretch/>
-        </p:blipFill>
-        <p:spPr>
-          <a:xfrm>
-            <a:off x="20" y="10"/>
-            <a:ext cx="12191980" cy="6857990"/>
-          </a:xfrm>
-          <a:prstGeom prst="rect">
-            <a:avLst/>
-          </a:prstGeom>
-        </p:spPr>
-      </p:pic>
-    </p:spTree>
-    <p:extLst>
-      <p:ext uri="{BB962C8B-B14F-4D97-AF65-F5344CB8AC3E}">
-        <p14:creationId xmlns:p14="http://schemas.microsoft.com/office/powerpoint/2010/main" val="3931550703"/>
-      </p:ext>
-    </p:extLst>
-  </p:cSld>
-  <p:clrMapOvr>
-    <a:masterClrMapping/>
-  </p:clrMapOvr>
-  <mc:AlternateContent xmlns:mc="http://schemas.openxmlformats.org/markup-compatibility/2006">
-    <mc:Choice xmlns:p14="http://schemas.microsoft.com/office/powerpoint/2010/main" Requires="p14">
-      <p:transition spd="med" p14:dur="700">
-        <p:fade/>
-      </p:transition>
-    </mc:Choice>
-    <mc:Fallback>
-      <p:transition spd="med">
-        <p:fade/>
-      </p:transition>
-    </mc:Fallback>
-  </mc:AlternateContent>
-</p:sld>
-</file>
-
-<file path=ppt/slides/slide6.xml><?xml version="1.0" encoding="utf-8"?>
-<p:sld xmlns:a="http://schemas.openxmlformats.org/drawingml/2006/main" xmlns:r="http://schemas.openxmlformats.org/officeDocument/2006/relationships" xmlns:p="http://schemas.openxmlformats.org/presentationml/2006/main">
-  <p:cSld>
-    <p:bg>
-      <p:bgPr>
-        <a:solidFill>
-          <a:schemeClr val="bg1"/>
-        </a:solidFill>
-        <a:effectLst/>
-      </p:bgPr>
-    </p:bg>
-    <p:spTree>
-      <p:nvGrpSpPr>
-        <p:cNvPr id="1" name=""/>
-        <p:cNvGrpSpPr/>
-        <p:nvPr/>
-      </p:nvGrpSpPr>
-      <p:grpSpPr>
-        <a:xfrm>
-          <a:off x="0" y="0"/>
-          <a:ext cx="0" cy="0"/>
-          <a:chOff x="0" y="0"/>
-          <a:chExt cx="0" cy="0"/>
-        </a:xfrm>
-      </p:grpSpPr>
-      <p:pic>
-        <p:nvPicPr>
-          <p:cNvPr id="8" name="Image 7" descr="Une image contenant table, pièce, ordinateur, compteur&#10;&#10;Description générée automatiquement">
-            <a:extLst>
-              <a:ext uri="{FF2B5EF4-FFF2-40B4-BE49-F238E27FC236}">
-                <a16:creationId xmlns:a16="http://schemas.microsoft.com/office/drawing/2014/main" id="{F0248986-8C8E-4A50-8D14-A4E4BB999EFB}"/>
-              </a:ext>
-            </a:extLst>
-          </p:cNvPr>
-          <p:cNvPicPr>
-            <a:picLocks noChangeAspect="1"/>
-          </p:cNvPicPr>
-          <p:nvPr/>
-        </p:nvPicPr>
-        <p:blipFill rotWithShape="1">
-          <a:blip r:embed="rId2">
-            <a:extLst>
-              <a:ext uri="{28A0092B-C50C-407E-A947-70E740481C1C}">
-                <a14:useLocalDpi xmlns:a14="http://schemas.microsoft.com/office/drawing/2010/main" val="0"/>
-              </a:ext>
-            </a:extLst>
-          </a:blip>
-          <a:srcRect t="11919" b="8576"/>
-          <a:stretch/>
-        </p:blipFill>
-        <p:spPr>
-          <a:xfrm>
-            <a:off x="20" y="10"/>
-            <a:ext cx="12191980" cy="6857990"/>
-          </a:xfrm>
-          <a:prstGeom prst="rect">
-            <a:avLst/>
-          </a:prstGeom>
-        </p:spPr>
-      </p:pic>
-      <p:pic>
-        <p:nvPicPr>
-          <p:cNvPr id="10" name="Image 9">
-            <a:extLst>
-              <a:ext uri="{FF2B5EF4-FFF2-40B4-BE49-F238E27FC236}">
-                <a16:creationId xmlns:a16="http://schemas.microsoft.com/office/drawing/2014/main" id="{FAAA65C8-2AA9-4725-BD45-C03570CA42D4}"/>
-              </a:ext>
-            </a:extLst>
-          </p:cNvPr>
-          <p:cNvPicPr>
-            <a:picLocks noChangeAspect="1"/>
-          </p:cNvPicPr>
-          <p:nvPr/>
-        </p:nvPicPr>
-        <p:blipFill>
-          <a:blip r:embed="rId3">
-            <a:extLst>
-              <a:ext uri="{28A0092B-C50C-407E-A947-70E740481C1C}">
-                <a14:useLocalDpi xmlns:a14="http://schemas.microsoft.com/office/drawing/2010/main" val="0"/>
-              </a:ext>
-            </a:extLst>
-          </a:blip>
-          <a:stretch>
-            <a:fillRect/>
-          </a:stretch>
-        </p:blipFill>
-        <p:spPr>
-          <a:xfrm>
-            <a:off x="1968759" y="4451955"/>
-            <a:ext cx="597159" cy="442271"/>
-          </a:xfrm>
-          <a:prstGeom prst="rect">
-            <a:avLst/>
-          </a:prstGeom>
-        </p:spPr>
-      </p:pic>
-    </p:spTree>
-    <p:extLst>
-      <p:ext uri="{BB962C8B-B14F-4D97-AF65-F5344CB8AC3E}">
-        <p14:creationId xmlns:p14="http://schemas.microsoft.com/office/powerpoint/2010/main" val="2949534445"/>
-      </p:ext>
-    </p:extLst>
-  </p:cSld>
-  <p:clrMapOvr>
-    <a:masterClrMapping/>
-  </p:clrMapOvr>
-  <mc:AlternateContent xmlns:mc="http://schemas.openxmlformats.org/markup-compatibility/2006">
-    <mc:Choice xmlns:p14="http://schemas.microsoft.com/office/powerpoint/2010/main" Requires="p14">
-      <p:transition spd="med" p14:dur="700">
-        <p:fade/>
-      </p:transition>
-    </mc:Choice>
-    <mc:Fallback>
-      <p:transition spd="med">
-        <p:fade/>
-      </p:transition>
-    </mc:Fallback>
-  </mc:AlternateContent>
-</p:sld>
-</file>
-
-<file path=ppt/slides/slide7.xml><?xml version="1.0" encoding="utf-8"?>
-<p:sld xmlns:a="http://schemas.openxmlformats.org/drawingml/2006/main" xmlns:r="http://schemas.openxmlformats.org/officeDocument/2006/relationships" xmlns:p="http://schemas.openxmlformats.org/presentationml/2006/main">
-  <p:cSld>
-    <p:bg>
-      <p:bgPr>
-        <a:solidFill>
-          <a:schemeClr val="bg1"/>
-        </a:solidFill>
-        <a:effectLst/>
-      </p:bgPr>
-    </p:bg>
-    <p:spTree>
-      <p:nvGrpSpPr>
-        <p:cNvPr id="1" name=""/>
-        <p:cNvGrpSpPr/>
-        <p:nvPr/>
-      </p:nvGrpSpPr>
-      <p:grpSpPr>
-        <a:xfrm>
-          <a:off x="0" y="0"/>
-          <a:ext cx="0" cy="0"/>
-          <a:chOff x="0" y="0"/>
-          <a:chExt cx="0" cy="0"/>
-        </a:xfrm>
-      </p:grpSpPr>
-      <p:pic>
-        <p:nvPicPr>
-          <p:cNvPr id="8" name="Image 7" descr="Une image contenant table, pièce, ordinateur, compteur&#10;&#10;Description générée automatiquement">
-            <a:extLst>
-              <a:ext uri="{FF2B5EF4-FFF2-40B4-BE49-F238E27FC236}">
-                <a16:creationId xmlns:a16="http://schemas.microsoft.com/office/drawing/2014/main" id="{F0248986-8C8E-4A50-8D14-A4E4BB999EFB}"/>
-              </a:ext>
-            </a:extLst>
-          </p:cNvPr>
-          <p:cNvPicPr>
-            <a:picLocks noChangeAspect="1"/>
-          </p:cNvPicPr>
-          <p:nvPr/>
-        </p:nvPicPr>
-        <p:blipFill rotWithShape="1">
-          <a:blip r:embed="rId2">
-            <a:extLst>
-              <a:ext uri="{28A0092B-C50C-407E-A947-70E740481C1C}">
-                <a14:useLocalDpi xmlns:a14="http://schemas.microsoft.com/office/drawing/2010/main" val="0"/>
-              </a:ext>
-            </a:extLst>
-          </a:blip>
-          <a:srcRect t="11919" b="8576"/>
-          <a:stretch/>
-        </p:blipFill>
-        <p:spPr>
-          <a:xfrm>
-            <a:off x="20" y="10"/>
-            <a:ext cx="12191980" cy="6857990"/>
-          </a:xfrm>
-          <a:prstGeom prst="rect">
-            <a:avLst/>
-          </a:prstGeom>
-        </p:spPr>
-      </p:pic>
-      <p:pic>
-        <p:nvPicPr>
-          <p:cNvPr id="10" name="Image 9">
-            <a:extLst>
-              <a:ext uri="{FF2B5EF4-FFF2-40B4-BE49-F238E27FC236}">
-                <a16:creationId xmlns:a16="http://schemas.microsoft.com/office/drawing/2014/main" id="{FAAA65C8-2AA9-4725-BD45-C03570CA42D4}"/>
-              </a:ext>
-            </a:extLst>
-          </p:cNvPr>
-          <p:cNvPicPr>
-            <a:picLocks noChangeAspect="1"/>
-          </p:cNvPicPr>
-          <p:nvPr/>
-        </p:nvPicPr>
-        <p:blipFill>
-          <a:blip r:embed="rId3">
-            <a:extLst>
-              <a:ext uri="{28A0092B-C50C-407E-A947-70E740481C1C}">
-                <a14:useLocalDpi xmlns:a14="http://schemas.microsoft.com/office/drawing/2010/main" val="0"/>
-              </a:ext>
-            </a:extLst>
-          </a:blip>
-          <a:stretch>
-            <a:fillRect/>
-          </a:stretch>
-        </p:blipFill>
-        <p:spPr>
-          <a:xfrm>
-            <a:off x="1968759" y="4451955"/>
-            <a:ext cx="597159" cy="442271"/>
-          </a:xfrm>
-          <a:prstGeom prst="rect">
-            <a:avLst/>
-          </a:prstGeom>
-        </p:spPr>
-      </p:pic>
-      <p:pic>
-        <p:nvPicPr>
-          <p:cNvPr id="5" name="Image 4" descr="Une image contenant fleur&#10;&#10;Description générée automatiquement">
-            <a:extLst>
-              <a:ext uri="{FF2B5EF4-FFF2-40B4-BE49-F238E27FC236}">
-                <a16:creationId xmlns:a16="http://schemas.microsoft.com/office/drawing/2014/main" id="{6B9246BD-8CAB-40B0-AEBB-E107882F9482}"/>
-              </a:ext>
-            </a:extLst>
-          </p:cNvPr>
-          <p:cNvPicPr>
-            <a:picLocks noChangeAspect="1"/>
-          </p:cNvPicPr>
-          <p:nvPr/>
-        </p:nvPicPr>
-        <p:blipFill>
-          <a:blip r:embed="rId4">
-            <a:extLst>
-              <a:ext uri="{28A0092B-C50C-407E-A947-70E740481C1C}">
-                <a14:useLocalDpi xmlns:a14="http://schemas.microsoft.com/office/drawing/2010/main" val="0"/>
-              </a:ext>
-            </a:extLst>
-          </a:blip>
-          <a:stretch>
-            <a:fillRect/>
-          </a:stretch>
-        </p:blipFill>
-        <p:spPr>
-          <a:xfrm>
-            <a:off x="2478237" y="1705164"/>
-            <a:ext cx="4361697" cy="4343409"/>
-          </a:xfrm>
-          <a:prstGeom prst="rect">
-            <a:avLst/>
-          </a:prstGeom>
-        </p:spPr>
-      </p:pic>
-      <p:pic>
-        <p:nvPicPr>
-          <p:cNvPr id="7" name="Image 6">
-            <a:extLst>
-              <a:ext uri="{FF2B5EF4-FFF2-40B4-BE49-F238E27FC236}">
-                <a16:creationId xmlns:a16="http://schemas.microsoft.com/office/drawing/2014/main" id="{EE75A5A1-C982-4F8B-BC64-8FC8FA3A21DA}"/>
-              </a:ext>
-            </a:extLst>
-          </p:cNvPr>
-          <p:cNvPicPr>
-            <a:picLocks noChangeAspect="1"/>
-          </p:cNvPicPr>
-          <p:nvPr/>
-        </p:nvPicPr>
-        <p:blipFill>
-          <a:blip r:embed="rId5">
-            <a:extLst>
-              <a:ext uri="{28A0092B-C50C-407E-A947-70E740481C1C}">
-                <a14:useLocalDpi xmlns:a14="http://schemas.microsoft.com/office/drawing/2010/main" val="0"/>
-              </a:ext>
-            </a:extLst>
-          </a:blip>
-          <a:stretch>
-            <a:fillRect/>
-          </a:stretch>
-        </p:blipFill>
-        <p:spPr>
-          <a:xfrm>
-            <a:off x="6839934" y="-309465"/>
-            <a:ext cx="4627387" cy="4627387"/>
-          </a:xfrm>
-          <a:prstGeom prst="rect">
-            <a:avLst/>
-          </a:prstGeom>
-        </p:spPr>
-      </p:pic>
-    </p:spTree>
-    <p:extLst>
-      <p:ext uri="{BB962C8B-B14F-4D97-AF65-F5344CB8AC3E}">
-        <p14:creationId xmlns:p14="http://schemas.microsoft.com/office/powerpoint/2010/main" val="2911778377"/>
-      </p:ext>
-    </p:extLst>
-  </p:cSld>
-  <p:clrMapOvr>
-    <a:masterClrMapping/>
-  </p:clrMapOvr>
-  <mc:AlternateContent xmlns:mc="http://schemas.openxmlformats.org/markup-compatibility/2006">
-    <mc:Choice xmlns:p14="http://schemas.microsoft.com/office/powerpoint/2010/main" Requires="p14">
-      <p:transition spd="med" p14:dur="700">
-        <p:fade/>
-      </p:transition>
-    </mc:Choice>
-    <mc:Fallback>
-      <p:transition spd="med">
-        <p:fade/>
-      </p:transition>
-    </mc:Fallback>
-  </mc:AlternateContent>
-</p:sld>
-</file>
-
-<file path=ppt/slides/slide8.xml><?xml version="1.0" encoding="utf-8"?>
-<p:sld xmlns:a="http://schemas.openxmlformats.org/drawingml/2006/main" xmlns:r="http://schemas.openxmlformats.org/officeDocument/2006/relationships" xmlns:p="http://schemas.openxmlformats.org/presentationml/2006/main">
-  <p:cSld>
-    <p:bg>
-      <p:bgPr>
-        <a:solidFill>
-          <a:schemeClr val="bg1"/>
-        </a:solidFill>
-        <a:effectLst/>
-      </p:bgPr>
-    </p:bg>
-    <p:spTree>
-      <p:nvGrpSpPr>
-        <p:cNvPr id="1" name=""/>
-        <p:cNvGrpSpPr/>
-        <p:nvPr/>
-      </p:nvGrpSpPr>
-      <p:grpSpPr>
-        <a:xfrm>
-          <a:off x="0" y="0"/>
-          <a:ext cx="0" cy="0"/>
-          <a:chOff x="0" y="0"/>
-          <a:chExt cx="0" cy="0"/>
-        </a:xfrm>
-      </p:grpSpPr>
-      <p:pic>
-        <p:nvPicPr>
-          <p:cNvPr id="8" name="Image 7" descr="Une image contenant table, pièce, ordinateur, compteur&#10;&#10;Description générée automatiquement">
-            <a:extLst>
-              <a:ext uri="{FF2B5EF4-FFF2-40B4-BE49-F238E27FC236}">
-                <a16:creationId xmlns:a16="http://schemas.microsoft.com/office/drawing/2014/main" id="{F0248986-8C8E-4A50-8D14-A4E4BB999EFB}"/>
-              </a:ext>
-            </a:extLst>
-          </p:cNvPr>
-          <p:cNvPicPr>
-            <a:picLocks noChangeAspect="1"/>
-          </p:cNvPicPr>
-          <p:nvPr/>
-        </p:nvPicPr>
-        <p:blipFill rotWithShape="1">
-          <a:blip r:embed="rId2">
-            <a:extLst>
-              <a:ext uri="{28A0092B-C50C-407E-A947-70E740481C1C}">
-                <a14:useLocalDpi xmlns:a14="http://schemas.microsoft.com/office/drawing/2010/main" val="0"/>
-              </a:ext>
-            </a:extLst>
-          </a:blip>
-          <a:srcRect t="11919" b="8576"/>
-          <a:stretch/>
-        </p:blipFill>
-        <p:spPr>
-          <a:xfrm>
-            <a:off x="20" y="10"/>
-            <a:ext cx="12191980" cy="6857990"/>
-          </a:xfrm>
-          <a:prstGeom prst="rect">
-            <a:avLst/>
-          </a:prstGeom>
-        </p:spPr>
-      </p:pic>
-      <p:pic>
-        <p:nvPicPr>
-          <p:cNvPr id="10" name="Image 9">
-            <a:extLst>
-              <a:ext uri="{FF2B5EF4-FFF2-40B4-BE49-F238E27FC236}">
-                <a16:creationId xmlns:a16="http://schemas.microsoft.com/office/drawing/2014/main" id="{FAAA65C8-2AA9-4725-BD45-C03570CA42D4}"/>
-              </a:ext>
-            </a:extLst>
-          </p:cNvPr>
-          <p:cNvPicPr>
-            <a:picLocks noChangeAspect="1"/>
-          </p:cNvPicPr>
-          <p:nvPr/>
-        </p:nvPicPr>
-        <p:blipFill>
-          <a:blip r:embed="rId3">
-            <a:extLst>
-              <a:ext uri="{28A0092B-C50C-407E-A947-70E740481C1C}">
-                <a14:useLocalDpi xmlns:a14="http://schemas.microsoft.com/office/drawing/2010/main" val="0"/>
-              </a:ext>
-            </a:extLst>
-          </a:blip>
-          <a:stretch>
-            <a:fillRect/>
-          </a:stretch>
-        </p:blipFill>
-        <p:spPr>
-          <a:xfrm>
-            <a:off x="2418140" y="1342239"/>
-            <a:ext cx="5906055" cy="4374173"/>
-          </a:xfrm>
-          <a:prstGeom prst="rect">
-            <a:avLst/>
-          </a:prstGeom>
-        </p:spPr>
-      </p:pic>
-      <p:sp>
-        <p:nvSpPr>
-          <p:cNvPr id="4" name="Titre 1">
-            <a:extLst>
-              <a:ext uri="{FF2B5EF4-FFF2-40B4-BE49-F238E27FC236}">
-                <a16:creationId xmlns:a16="http://schemas.microsoft.com/office/drawing/2014/main" id="{5194D6EF-1EB7-4F41-97C0-9338EBA11917}"/>
-              </a:ext>
-            </a:extLst>
-          </p:cNvPr>
-          <p:cNvSpPr>
-            <a:spLocks noGrp="1"/>
-          </p:cNvSpPr>
-          <p:nvPr>
-            <p:ph type="ctrTitle"/>
-          </p:nvPr>
-        </p:nvSpPr>
-        <p:spPr>
-          <a:xfrm>
-            <a:off x="0" y="134860"/>
-            <a:ext cx="2976465" cy="891507"/>
-          </a:xfrm>
-        </p:spPr>
-        <p:txBody>
-          <a:bodyPr>
-            <a:normAutofit/>
-          </a:bodyPr>
-          <a:lstStyle/>
-          <a:p>
-            <a:r>
-              <a:rPr lang="fr-FR" sz="5400" b="1" dirty="0" err="1">
-                <a:solidFill>
-                  <a:srgbClr val="FF0000"/>
-                </a:solidFill>
-                <a:latin typeface="+mn-lt"/>
-                <a:cs typeface="Times New Roman" panose="02020603050405020304" pitchFamily="18" charset="0"/>
-              </a:rPr>
-              <a:t>Rewards</a:t>
-            </a:r>
-            <a:endParaRPr lang="fr-FR" sz="5400" b="1" dirty="0">
-              <a:solidFill>
-                <a:srgbClr val="FF0000"/>
-              </a:solidFill>
-              <a:latin typeface="+mn-lt"/>
-              <a:cs typeface="Times New Roman" panose="02020603050405020304" pitchFamily="18" charset="0"/>
-            </a:endParaRPr>
-          </a:p>
-        </p:txBody>
-      </p:sp>
-    </p:spTree>
-    <p:extLst>
-      <p:ext uri="{BB962C8B-B14F-4D97-AF65-F5344CB8AC3E}">
-        <p14:creationId xmlns:p14="http://schemas.microsoft.com/office/powerpoint/2010/main" val="287317412"/>
-      </p:ext>
-    </p:extLst>
-  </p:cSld>
-  <p:clrMapOvr>
-    <a:masterClrMapping/>
-  </p:clrMapOvr>
-  <mc:AlternateContent xmlns:mc="http://schemas.openxmlformats.org/markup-compatibility/2006">
-    <mc:Choice xmlns:p159="http://schemas.microsoft.com/office/powerpoint/2015/09/main" Requires="p159">
-      <p:transition xmlns:p14="http://schemas.microsoft.com/office/powerpoint/2010/main" spd="slow" p14:dur="2000">
-        <p159:morph option="byObject"/>
-      </p:transition>
-    </mc:Choice>
-    <mc:Fallback>
-      <p:transition spd="slow">
-        <p:fade/>
-      </p:transition>
-    </mc:Fallback>
-  </mc:AlternateContent>
-</p:sld>
-</file>
-
-<file path=ppt/slides/slide9.xml><?xml version="1.0" encoding="utf-8"?>
 <p:sld xmlns:a="http://schemas.openxmlformats.org/drawingml/2006/main" xmlns:r="http://schemas.openxmlformats.org/officeDocument/2006/relationships" xmlns:p="http://schemas.openxmlformats.org/presentationml/2006/main">
   <p:cSld>
     <p:bg>
@@ -6314,13 +4562,1941 @@
   <p:clrMapOvr>
     <a:overrideClrMapping bg1="dk1" tx1="lt1" bg2="dk2" tx2="lt2" accent1="accent1" accent2="accent2" accent3="accent3" accent4="accent4" accent5="accent5" accent6="accent6" hlink="hlink" folHlink="folHlink"/>
   </p:clrMapOvr>
-  <mc:AlternateContent xmlns:mc="http://schemas.openxmlformats.org/markup-compatibility/2006">
-    <mc:Choice xmlns:p159="http://schemas.microsoft.com/office/powerpoint/2015/09/main" Requires="p159">
+  <mc:AlternateContent xmlns:mc="http://schemas.openxmlformats.org/markup-compatibility/2006" xmlns:p159="http://schemas.microsoft.com/office/powerpoint/2015/09/main">
+    <mc:Choice Requires="p159">
       <p:transition xmlns:p14="http://schemas.microsoft.com/office/powerpoint/2010/main" spd="slow" p14:dur="2000">
         <p159:morph option="byObject"/>
       </p:transition>
     </mc:Choice>
-    <mc:Fallback>
+    <mc:Fallback xmlns="">
+      <p:transition spd="slow">
+        <p:fade/>
+      </p:transition>
+    </mc:Fallback>
+  </mc:AlternateContent>
+</p:sld>
+</file>
+
+<file path=ppt/slides/slide11.xml><?xml version="1.0" encoding="utf-8"?>
+<p:sld xmlns:a="http://schemas.openxmlformats.org/drawingml/2006/main" xmlns:r="http://schemas.openxmlformats.org/officeDocument/2006/relationships" xmlns:p="http://schemas.openxmlformats.org/presentationml/2006/main">
+  <p:cSld>
+    <p:spTree>
+      <p:nvGrpSpPr>
+        <p:cNvPr id="1" name=""/>
+        <p:cNvGrpSpPr/>
+        <p:nvPr/>
+      </p:nvGrpSpPr>
+      <p:grpSpPr>
+        <a:xfrm>
+          <a:off x="0" y="0"/>
+          <a:ext cx="0" cy="0"/>
+          <a:chOff x="0" y="0"/>
+          <a:chExt cx="0" cy="0"/>
+        </a:xfrm>
+      </p:grpSpPr>
+      <p:pic>
+        <p:nvPicPr>
+          <p:cNvPr id="17" name="Image 16" descr="Une image contenant bâtiment, cité, grand, assis&#10;&#10;Description générée automatiquement">
+            <a:extLst>
+              <a:ext uri="{FF2B5EF4-FFF2-40B4-BE49-F238E27FC236}">
+                <a16:creationId xmlns:a16="http://schemas.microsoft.com/office/drawing/2014/main" id="{6CF04101-E0D4-4105-A8F6-73217A3E211B}"/>
+              </a:ext>
+            </a:extLst>
+          </p:cNvPr>
+          <p:cNvPicPr>
+            <a:picLocks noChangeAspect="1"/>
+          </p:cNvPicPr>
+          <p:nvPr/>
+        </p:nvPicPr>
+        <p:blipFill>
+          <a:blip r:embed="rId2">
+            <a:extLst>
+              <a:ext uri="{28A0092B-C50C-407E-A947-70E740481C1C}">
+                <a14:useLocalDpi xmlns:a14="http://schemas.microsoft.com/office/drawing/2010/main" val="0"/>
+              </a:ext>
+            </a:extLst>
+          </a:blip>
+          <a:stretch>
+            <a:fillRect/>
+          </a:stretch>
+        </p:blipFill>
+        <p:spPr>
+          <a:xfrm>
+            <a:off x="0" y="0"/>
+            <a:ext cx="12192000" cy="6868732"/>
+          </a:xfrm>
+          <a:prstGeom prst="rect">
+            <a:avLst/>
+          </a:prstGeom>
+        </p:spPr>
+      </p:pic>
+      <p:sp>
+        <p:nvSpPr>
+          <p:cNvPr id="2" name="Titre 1">
+            <a:extLst>
+              <a:ext uri="{FF2B5EF4-FFF2-40B4-BE49-F238E27FC236}">
+                <a16:creationId xmlns:a16="http://schemas.microsoft.com/office/drawing/2014/main" id="{461C7968-4A46-4689-AB1E-51CA29617B56}"/>
+              </a:ext>
+            </a:extLst>
+          </p:cNvPr>
+          <p:cNvSpPr>
+            <a:spLocks noGrp="1"/>
+          </p:cNvSpPr>
+          <p:nvPr>
+            <p:ph type="ctrTitle"/>
+          </p:nvPr>
+        </p:nvSpPr>
+        <p:spPr>
+          <a:xfrm>
+            <a:off x="3946584" y="311968"/>
+            <a:ext cx="4298832" cy="1088336"/>
+          </a:xfrm>
+        </p:spPr>
+        <p:txBody>
+          <a:bodyPr>
+            <a:normAutofit/>
+          </a:bodyPr>
+          <a:lstStyle/>
+          <a:p>
+            <a:r>
+              <a:rPr lang="fr-FR" b="1" dirty="0">
+                <a:solidFill>
+                  <a:srgbClr val="FF0000"/>
+                </a:solidFill>
+                <a:latin typeface="+mn-lt"/>
+                <a:cs typeface="Times New Roman" panose="02020603050405020304" pitchFamily="18" charset="0"/>
+              </a:rPr>
+              <a:t>OFFICE RAGE</a:t>
+            </a:r>
+          </a:p>
+        </p:txBody>
+      </p:sp>
+      <p:sp>
+        <p:nvSpPr>
+          <p:cNvPr id="20" name="Sous-titre 19">
+            <a:extLst>
+              <a:ext uri="{FF2B5EF4-FFF2-40B4-BE49-F238E27FC236}">
+                <a16:creationId xmlns:a16="http://schemas.microsoft.com/office/drawing/2014/main" id="{FBAA5A9B-B58B-416D-9391-76D34BEFACF5}"/>
+              </a:ext>
+            </a:extLst>
+          </p:cNvPr>
+          <p:cNvSpPr>
+            <a:spLocks noGrp="1"/>
+          </p:cNvSpPr>
+          <p:nvPr>
+            <p:ph type="subTitle" idx="1"/>
+          </p:nvPr>
+        </p:nvSpPr>
+        <p:spPr>
+          <a:xfrm>
+            <a:off x="553584" y="1617961"/>
+            <a:ext cx="2458456" cy="616027"/>
+          </a:xfrm>
+        </p:spPr>
+        <p:txBody>
+          <a:bodyPr>
+            <a:normAutofit/>
+          </a:bodyPr>
+          <a:lstStyle/>
+          <a:p>
+            <a:r>
+              <a:rPr lang="fr-FR" b="1" dirty="0"/>
+              <a:t>Alexandre SACHS</a:t>
+            </a:r>
+          </a:p>
+        </p:txBody>
+      </p:sp>
+      <p:sp>
+        <p:nvSpPr>
+          <p:cNvPr id="23" name="Sous-titre 19">
+            <a:extLst>
+              <a:ext uri="{FF2B5EF4-FFF2-40B4-BE49-F238E27FC236}">
+                <a16:creationId xmlns:a16="http://schemas.microsoft.com/office/drawing/2014/main" id="{FA048EA7-E52E-4C96-9A7F-23E5D2BEFD44}"/>
+              </a:ext>
+            </a:extLst>
+          </p:cNvPr>
+          <p:cNvSpPr txBox="1">
+            <a:spLocks/>
+          </p:cNvSpPr>
+          <p:nvPr/>
+        </p:nvSpPr>
+        <p:spPr>
+          <a:xfrm>
+            <a:off x="4946021" y="3371316"/>
+            <a:ext cx="2458456" cy="616027"/>
+          </a:xfrm>
+          <a:prstGeom prst="rect">
+            <a:avLst/>
+          </a:prstGeom>
+        </p:spPr>
+        <p:txBody>
+          <a:bodyPr vert="horz" lIns="91440" tIns="45720" rIns="91440" bIns="45720" rtlCol="0">
+            <a:normAutofit/>
+          </a:bodyPr>
+          <a:lstStyle>
+            <a:lvl1pPr marL="0" indent="0" algn="ctr" defTabSz="914400" rtl="0" eaLnBrk="1" latinLnBrk="0" hangingPunct="1">
+              <a:lnSpc>
+                <a:spcPct val="90000"/>
+              </a:lnSpc>
+              <a:spcBef>
+                <a:spcPts val="1000"/>
+              </a:spcBef>
+              <a:buFont typeface="Arial" panose="020B0604020202020204" pitchFamily="34" charset="0"/>
+              <a:buNone/>
+              <a:defRPr sz="2400" kern="1200">
+                <a:solidFill>
+                  <a:schemeClr val="tx1"/>
+                </a:solidFill>
+                <a:latin typeface="+mn-lt"/>
+                <a:ea typeface="+mn-ea"/>
+                <a:cs typeface="+mn-cs"/>
+              </a:defRPr>
+            </a:lvl1pPr>
+            <a:lvl2pPr marL="457200" indent="0" algn="ctr" defTabSz="914400" rtl="0" eaLnBrk="1" latinLnBrk="0" hangingPunct="1">
+              <a:lnSpc>
+                <a:spcPct val="90000"/>
+              </a:lnSpc>
+              <a:spcBef>
+                <a:spcPts val="500"/>
+              </a:spcBef>
+              <a:buFont typeface="Arial" panose="020B0604020202020204" pitchFamily="34" charset="0"/>
+              <a:buNone/>
+              <a:defRPr sz="2000" kern="1200">
+                <a:solidFill>
+                  <a:schemeClr val="tx1"/>
+                </a:solidFill>
+                <a:latin typeface="+mn-lt"/>
+                <a:ea typeface="+mn-ea"/>
+                <a:cs typeface="+mn-cs"/>
+              </a:defRPr>
+            </a:lvl2pPr>
+            <a:lvl3pPr marL="914400" indent="0" algn="ctr" defTabSz="914400" rtl="0" eaLnBrk="1" latinLnBrk="0" hangingPunct="1">
+              <a:lnSpc>
+                <a:spcPct val="90000"/>
+              </a:lnSpc>
+              <a:spcBef>
+                <a:spcPts val="500"/>
+              </a:spcBef>
+              <a:buFont typeface="Arial" panose="020B0604020202020204" pitchFamily="34" charset="0"/>
+              <a:buNone/>
+              <a:defRPr sz="1800" kern="1200">
+                <a:solidFill>
+                  <a:schemeClr val="tx1"/>
+                </a:solidFill>
+                <a:latin typeface="+mn-lt"/>
+                <a:ea typeface="+mn-ea"/>
+                <a:cs typeface="+mn-cs"/>
+              </a:defRPr>
+            </a:lvl3pPr>
+            <a:lvl4pPr marL="1371600" indent="0" algn="ctr" defTabSz="914400" rtl="0" eaLnBrk="1" latinLnBrk="0" hangingPunct="1">
+              <a:lnSpc>
+                <a:spcPct val="90000"/>
+              </a:lnSpc>
+              <a:spcBef>
+                <a:spcPts val="500"/>
+              </a:spcBef>
+              <a:buFont typeface="Arial" panose="020B0604020202020204" pitchFamily="34" charset="0"/>
+              <a:buNone/>
+              <a:defRPr sz="1600" kern="1200">
+                <a:solidFill>
+                  <a:schemeClr val="tx1"/>
+                </a:solidFill>
+                <a:latin typeface="+mn-lt"/>
+                <a:ea typeface="+mn-ea"/>
+                <a:cs typeface="+mn-cs"/>
+              </a:defRPr>
+            </a:lvl4pPr>
+            <a:lvl5pPr marL="1828800" indent="0" algn="ctr" defTabSz="914400" rtl="0" eaLnBrk="1" latinLnBrk="0" hangingPunct="1">
+              <a:lnSpc>
+                <a:spcPct val="90000"/>
+              </a:lnSpc>
+              <a:spcBef>
+                <a:spcPts val="500"/>
+              </a:spcBef>
+              <a:buFont typeface="Arial" panose="020B0604020202020204" pitchFamily="34" charset="0"/>
+              <a:buNone/>
+              <a:defRPr sz="1600" kern="1200">
+                <a:solidFill>
+                  <a:schemeClr val="tx1"/>
+                </a:solidFill>
+                <a:latin typeface="+mn-lt"/>
+                <a:ea typeface="+mn-ea"/>
+                <a:cs typeface="+mn-cs"/>
+              </a:defRPr>
+            </a:lvl5pPr>
+            <a:lvl6pPr marL="2286000" indent="0" algn="ctr" defTabSz="914400" rtl="0" eaLnBrk="1" latinLnBrk="0" hangingPunct="1">
+              <a:lnSpc>
+                <a:spcPct val="90000"/>
+              </a:lnSpc>
+              <a:spcBef>
+                <a:spcPts val="500"/>
+              </a:spcBef>
+              <a:buFont typeface="Arial" panose="020B0604020202020204" pitchFamily="34" charset="0"/>
+              <a:buNone/>
+              <a:defRPr sz="1600" kern="1200">
+                <a:solidFill>
+                  <a:schemeClr val="tx1"/>
+                </a:solidFill>
+                <a:latin typeface="+mn-lt"/>
+                <a:ea typeface="+mn-ea"/>
+                <a:cs typeface="+mn-cs"/>
+              </a:defRPr>
+            </a:lvl6pPr>
+            <a:lvl7pPr marL="2743200" indent="0" algn="ctr" defTabSz="914400" rtl="0" eaLnBrk="1" latinLnBrk="0" hangingPunct="1">
+              <a:lnSpc>
+                <a:spcPct val="90000"/>
+              </a:lnSpc>
+              <a:spcBef>
+                <a:spcPts val="500"/>
+              </a:spcBef>
+              <a:buFont typeface="Arial" panose="020B0604020202020204" pitchFamily="34" charset="0"/>
+              <a:buNone/>
+              <a:defRPr sz="1600" kern="1200">
+                <a:solidFill>
+                  <a:schemeClr val="tx1"/>
+                </a:solidFill>
+                <a:latin typeface="+mn-lt"/>
+                <a:ea typeface="+mn-ea"/>
+                <a:cs typeface="+mn-cs"/>
+              </a:defRPr>
+            </a:lvl7pPr>
+            <a:lvl8pPr marL="3200400" indent="0" algn="ctr" defTabSz="914400" rtl="0" eaLnBrk="1" latinLnBrk="0" hangingPunct="1">
+              <a:lnSpc>
+                <a:spcPct val="90000"/>
+              </a:lnSpc>
+              <a:spcBef>
+                <a:spcPts val="500"/>
+              </a:spcBef>
+              <a:buFont typeface="Arial" panose="020B0604020202020204" pitchFamily="34" charset="0"/>
+              <a:buNone/>
+              <a:defRPr sz="1600" kern="1200">
+                <a:solidFill>
+                  <a:schemeClr val="tx1"/>
+                </a:solidFill>
+                <a:latin typeface="+mn-lt"/>
+                <a:ea typeface="+mn-ea"/>
+                <a:cs typeface="+mn-cs"/>
+              </a:defRPr>
+            </a:lvl8pPr>
+            <a:lvl9pPr marL="3657600" indent="0" algn="ctr" defTabSz="914400" rtl="0" eaLnBrk="1" latinLnBrk="0" hangingPunct="1">
+              <a:lnSpc>
+                <a:spcPct val="90000"/>
+              </a:lnSpc>
+              <a:spcBef>
+                <a:spcPts val="500"/>
+              </a:spcBef>
+              <a:buFont typeface="Arial" panose="020B0604020202020204" pitchFamily="34" charset="0"/>
+              <a:buNone/>
+              <a:defRPr sz="1600" kern="1200">
+                <a:solidFill>
+                  <a:schemeClr val="tx1"/>
+                </a:solidFill>
+                <a:latin typeface="+mn-lt"/>
+                <a:ea typeface="+mn-ea"/>
+                <a:cs typeface="+mn-cs"/>
+              </a:defRPr>
+            </a:lvl9pPr>
+          </a:lstStyle>
+          <a:p>
+            <a:r>
+              <a:rPr lang="fr-FR" b="1" dirty="0"/>
+              <a:t>Charles </a:t>
+            </a:r>
+            <a:r>
+              <a:rPr lang="fr-FR" b="1" dirty="0" err="1"/>
+              <a:t>Descoust</a:t>
+            </a:r>
+            <a:endParaRPr lang="fr-FR" b="1" dirty="0"/>
+          </a:p>
+        </p:txBody>
+      </p:sp>
+      <p:sp>
+        <p:nvSpPr>
+          <p:cNvPr id="24" name="Sous-titre 19">
+            <a:extLst>
+              <a:ext uri="{FF2B5EF4-FFF2-40B4-BE49-F238E27FC236}">
+                <a16:creationId xmlns:a16="http://schemas.microsoft.com/office/drawing/2014/main" id="{BD9014D6-A435-4343-95FD-BEF39B9EEDA0}"/>
+              </a:ext>
+            </a:extLst>
+          </p:cNvPr>
+          <p:cNvSpPr txBox="1">
+            <a:spLocks/>
+          </p:cNvSpPr>
+          <p:nvPr/>
+        </p:nvSpPr>
+        <p:spPr>
+          <a:xfrm>
+            <a:off x="7016188" y="1712272"/>
+            <a:ext cx="2458456" cy="616027"/>
+          </a:xfrm>
+          <a:prstGeom prst="rect">
+            <a:avLst/>
+          </a:prstGeom>
+        </p:spPr>
+        <p:txBody>
+          <a:bodyPr vert="horz" lIns="91440" tIns="45720" rIns="91440" bIns="45720" rtlCol="0">
+            <a:normAutofit/>
+          </a:bodyPr>
+          <a:lstStyle>
+            <a:lvl1pPr marL="0" indent="0" algn="ctr" defTabSz="914400" rtl="0" eaLnBrk="1" latinLnBrk="0" hangingPunct="1">
+              <a:lnSpc>
+                <a:spcPct val="90000"/>
+              </a:lnSpc>
+              <a:spcBef>
+                <a:spcPts val="1000"/>
+              </a:spcBef>
+              <a:buFont typeface="Arial" panose="020B0604020202020204" pitchFamily="34" charset="0"/>
+              <a:buNone/>
+              <a:defRPr sz="2400" kern="1200">
+                <a:solidFill>
+                  <a:schemeClr val="tx1"/>
+                </a:solidFill>
+                <a:latin typeface="+mn-lt"/>
+                <a:ea typeface="+mn-ea"/>
+                <a:cs typeface="+mn-cs"/>
+              </a:defRPr>
+            </a:lvl1pPr>
+            <a:lvl2pPr marL="457200" indent="0" algn="ctr" defTabSz="914400" rtl="0" eaLnBrk="1" latinLnBrk="0" hangingPunct="1">
+              <a:lnSpc>
+                <a:spcPct val="90000"/>
+              </a:lnSpc>
+              <a:spcBef>
+                <a:spcPts val="500"/>
+              </a:spcBef>
+              <a:buFont typeface="Arial" panose="020B0604020202020204" pitchFamily="34" charset="0"/>
+              <a:buNone/>
+              <a:defRPr sz="2000" kern="1200">
+                <a:solidFill>
+                  <a:schemeClr val="tx1"/>
+                </a:solidFill>
+                <a:latin typeface="+mn-lt"/>
+                <a:ea typeface="+mn-ea"/>
+                <a:cs typeface="+mn-cs"/>
+              </a:defRPr>
+            </a:lvl2pPr>
+            <a:lvl3pPr marL="914400" indent="0" algn="ctr" defTabSz="914400" rtl="0" eaLnBrk="1" latinLnBrk="0" hangingPunct="1">
+              <a:lnSpc>
+                <a:spcPct val="90000"/>
+              </a:lnSpc>
+              <a:spcBef>
+                <a:spcPts val="500"/>
+              </a:spcBef>
+              <a:buFont typeface="Arial" panose="020B0604020202020204" pitchFamily="34" charset="0"/>
+              <a:buNone/>
+              <a:defRPr sz="1800" kern="1200">
+                <a:solidFill>
+                  <a:schemeClr val="tx1"/>
+                </a:solidFill>
+                <a:latin typeface="+mn-lt"/>
+                <a:ea typeface="+mn-ea"/>
+                <a:cs typeface="+mn-cs"/>
+              </a:defRPr>
+            </a:lvl3pPr>
+            <a:lvl4pPr marL="1371600" indent="0" algn="ctr" defTabSz="914400" rtl="0" eaLnBrk="1" latinLnBrk="0" hangingPunct="1">
+              <a:lnSpc>
+                <a:spcPct val="90000"/>
+              </a:lnSpc>
+              <a:spcBef>
+                <a:spcPts val="500"/>
+              </a:spcBef>
+              <a:buFont typeface="Arial" panose="020B0604020202020204" pitchFamily="34" charset="0"/>
+              <a:buNone/>
+              <a:defRPr sz="1600" kern="1200">
+                <a:solidFill>
+                  <a:schemeClr val="tx1"/>
+                </a:solidFill>
+                <a:latin typeface="+mn-lt"/>
+                <a:ea typeface="+mn-ea"/>
+                <a:cs typeface="+mn-cs"/>
+              </a:defRPr>
+            </a:lvl4pPr>
+            <a:lvl5pPr marL="1828800" indent="0" algn="ctr" defTabSz="914400" rtl="0" eaLnBrk="1" latinLnBrk="0" hangingPunct="1">
+              <a:lnSpc>
+                <a:spcPct val="90000"/>
+              </a:lnSpc>
+              <a:spcBef>
+                <a:spcPts val="500"/>
+              </a:spcBef>
+              <a:buFont typeface="Arial" panose="020B0604020202020204" pitchFamily="34" charset="0"/>
+              <a:buNone/>
+              <a:defRPr sz="1600" kern="1200">
+                <a:solidFill>
+                  <a:schemeClr val="tx1"/>
+                </a:solidFill>
+                <a:latin typeface="+mn-lt"/>
+                <a:ea typeface="+mn-ea"/>
+                <a:cs typeface="+mn-cs"/>
+              </a:defRPr>
+            </a:lvl5pPr>
+            <a:lvl6pPr marL="2286000" indent="0" algn="ctr" defTabSz="914400" rtl="0" eaLnBrk="1" latinLnBrk="0" hangingPunct="1">
+              <a:lnSpc>
+                <a:spcPct val="90000"/>
+              </a:lnSpc>
+              <a:spcBef>
+                <a:spcPts val="500"/>
+              </a:spcBef>
+              <a:buFont typeface="Arial" panose="020B0604020202020204" pitchFamily="34" charset="0"/>
+              <a:buNone/>
+              <a:defRPr sz="1600" kern="1200">
+                <a:solidFill>
+                  <a:schemeClr val="tx1"/>
+                </a:solidFill>
+                <a:latin typeface="+mn-lt"/>
+                <a:ea typeface="+mn-ea"/>
+                <a:cs typeface="+mn-cs"/>
+              </a:defRPr>
+            </a:lvl6pPr>
+            <a:lvl7pPr marL="2743200" indent="0" algn="ctr" defTabSz="914400" rtl="0" eaLnBrk="1" latinLnBrk="0" hangingPunct="1">
+              <a:lnSpc>
+                <a:spcPct val="90000"/>
+              </a:lnSpc>
+              <a:spcBef>
+                <a:spcPts val="500"/>
+              </a:spcBef>
+              <a:buFont typeface="Arial" panose="020B0604020202020204" pitchFamily="34" charset="0"/>
+              <a:buNone/>
+              <a:defRPr sz="1600" kern="1200">
+                <a:solidFill>
+                  <a:schemeClr val="tx1"/>
+                </a:solidFill>
+                <a:latin typeface="+mn-lt"/>
+                <a:ea typeface="+mn-ea"/>
+                <a:cs typeface="+mn-cs"/>
+              </a:defRPr>
+            </a:lvl7pPr>
+            <a:lvl8pPr marL="3200400" indent="0" algn="ctr" defTabSz="914400" rtl="0" eaLnBrk="1" latinLnBrk="0" hangingPunct="1">
+              <a:lnSpc>
+                <a:spcPct val="90000"/>
+              </a:lnSpc>
+              <a:spcBef>
+                <a:spcPts val="500"/>
+              </a:spcBef>
+              <a:buFont typeface="Arial" panose="020B0604020202020204" pitchFamily="34" charset="0"/>
+              <a:buNone/>
+              <a:defRPr sz="1600" kern="1200">
+                <a:solidFill>
+                  <a:schemeClr val="tx1"/>
+                </a:solidFill>
+                <a:latin typeface="+mn-lt"/>
+                <a:ea typeface="+mn-ea"/>
+                <a:cs typeface="+mn-cs"/>
+              </a:defRPr>
+            </a:lvl8pPr>
+            <a:lvl9pPr marL="3657600" indent="0" algn="ctr" defTabSz="914400" rtl="0" eaLnBrk="1" latinLnBrk="0" hangingPunct="1">
+              <a:lnSpc>
+                <a:spcPct val="90000"/>
+              </a:lnSpc>
+              <a:spcBef>
+                <a:spcPts val="500"/>
+              </a:spcBef>
+              <a:buFont typeface="Arial" panose="020B0604020202020204" pitchFamily="34" charset="0"/>
+              <a:buNone/>
+              <a:defRPr sz="1600" kern="1200">
+                <a:solidFill>
+                  <a:schemeClr val="tx1"/>
+                </a:solidFill>
+                <a:latin typeface="+mn-lt"/>
+                <a:ea typeface="+mn-ea"/>
+                <a:cs typeface="+mn-cs"/>
+              </a:defRPr>
+            </a:lvl9pPr>
+          </a:lstStyle>
+          <a:p>
+            <a:r>
+              <a:rPr lang="fr-FR" b="1" dirty="0"/>
+              <a:t>Raphaël Guy</a:t>
+            </a:r>
+          </a:p>
+        </p:txBody>
+      </p:sp>
+      <p:sp>
+        <p:nvSpPr>
+          <p:cNvPr id="25" name="Sous-titre 19">
+            <a:extLst>
+              <a:ext uri="{FF2B5EF4-FFF2-40B4-BE49-F238E27FC236}">
+                <a16:creationId xmlns:a16="http://schemas.microsoft.com/office/drawing/2014/main" id="{BA926F7D-99CD-4681-8F4E-01D62A58E841}"/>
+              </a:ext>
+            </a:extLst>
+          </p:cNvPr>
+          <p:cNvSpPr txBox="1">
+            <a:spLocks/>
+          </p:cNvSpPr>
+          <p:nvPr/>
+        </p:nvSpPr>
+        <p:spPr>
+          <a:xfrm>
+            <a:off x="1352177" y="2715150"/>
+            <a:ext cx="2458456" cy="616027"/>
+          </a:xfrm>
+          <a:prstGeom prst="rect">
+            <a:avLst/>
+          </a:prstGeom>
+        </p:spPr>
+        <p:txBody>
+          <a:bodyPr vert="horz" lIns="91440" tIns="45720" rIns="91440" bIns="45720" rtlCol="0">
+            <a:normAutofit/>
+          </a:bodyPr>
+          <a:lstStyle>
+            <a:lvl1pPr marL="0" indent="0" algn="ctr" defTabSz="914400" rtl="0" eaLnBrk="1" latinLnBrk="0" hangingPunct="1">
+              <a:lnSpc>
+                <a:spcPct val="90000"/>
+              </a:lnSpc>
+              <a:spcBef>
+                <a:spcPts val="1000"/>
+              </a:spcBef>
+              <a:buFont typeface="Arial" panose="020B0604020202020204" pitchFamily="34" charset="0"/>
+              <a:buNone/>
+              <a:defRPr sz="2400" kern="1200">
+                <a:solidFill>
+                  <a:schemeClr val="tx1"/>
+                </a:solidFill>
+                <a:latin typeface="+mn-lt"/>
+                <a:ea typeface="+mn-ea"/>
+                <a:cs typeface="+mn-cs"/>
+              </a:defRPr>
+            </a:lvl1pPr>
+            <a:lvl2pPr marL="457200" indent="0" algn="ctr" defTabSz="914400" rtl="0" eaLnBrk="1" latinLnBrk="0" hangingPunct="1">
+              <a:lnSpc>
+                <a:spcPct val="90000"/>
+              </a:lnSpc>
+              <a:spcBef>
+                <a:spcPts val="500"/>
+              </a:spcBef>
+              <a:buFont typeface="Arial" panose="020B0604020202020204" pitchFamily="34" charset="0"/>
+              <a:buNone/>
+              <a:defRPr sz="2000" kern="1200">
+                <a:solidFill>
+                  <a:schemeClr val="tx1"/>
+                </a:solidFill>
+                <a:latin typeface="+mn-lt"/>
+                <a:ea typeface="+mn-ea"/>
+                <a:cs typeface="+mn-cs"/>
+              </a:defRPr>
+            </a:lvl2pPr>
+            <a:lvl3pPr marL="914400" indent="0" algn="ctr" defTabSz="914400" rtl="0" eaLnBrk="1" latinLnBrk="0" hangingPunct="1">
+              <a:lnSpc>
+                <a:spcPct val="90000"/>
+              </a:lnSpc>
+              <a:spcBef>
+                <a:spcPts val="500"/>
+              </a:spcBef>
+              <a:buFont typeface="Arial" panose="020B0604020202020204" pitchFamily="34" charset="0"/>
+              <a:buNone/>
+              <a:defRPr sz="1800" kern="1200">
+                <a:solidFill>
+                  <a:schemeClr val="tx1"/>
+                </a:solidFill>
+                <a:latin typeface="+mn-lt"/>
+                <a:ea typeface="+mn-ea"/>
+                <a:cs typeface="+mn-cs"/>
+              </a:defRPr>
+            </a:lvl3pPr>
+            <a:lvl4pPr marL="1371600" indent="0" algn="ctr" defTabSz="914400" rtl="0" eaLnBrk="1" latinLnBrk="0" hangingPunct="1">
+              <a:lnSpc>
+                <a:spcPct val="90000"/>
+              </a:lnSpc>
+              <a:spcBef>
+                <a:spcPts val="500"/>
+              </a:spcBef>
+              <a:buFont typeface="Arial" panose="020B0604020202020204" pitchFamily="34" charset="0"/>
+              <a:buNone/>
+              <a:defRPr sz="1600" kern="1200">
+                <a:solidFill>
+                  <a:schemeClr val="tx1"/>
+                </a:solidFill>
+                <a:latin typeface="+mn-lt"/>
+                <a:ea typeface="+mn-ea"/>
+                <a:cs typeface="+mn-cs"/>
+              </a:defRPr>
+            </a:lvl4pPr>
+            <a:lvl5pPr marL="1828800" indent="0" algn="ctr" defTabSz="914400" rtl="0" eaLnBrk="1" latinLnBrk="0" hangingPunct="1">
+              <a:lnSpc>
+                <a:spcPct val="90000"/>
+              </a:lnSpc>
+              <a:spcBef>
+                <a:spcPts val="500"/>
+              </a:spcBef>
+              <a:buFont typeface="Arial" panose="020B0604020202020204" pitchFamily="34" charset="0"/>
+              <a:buNone/>
+              <a:defRPr sz="1600" kern="1200">
+                <a:solidFill>
+                  <a:schemeClr val="tx1"/>
+                </a:solidFill>
+                <a:latin typeface="+mn-lt"/>
+                <a:ea typeface="+mn-ea"/>
+                <a:cs typeface="+mn-cs"/>
+              </a:defRPr>
+            </a:lvl5pPr>
+            <a:lvl6pPr marL="2286000" indent="0" algn="ctr" defTabSz="914400" rtl="0" eaLnBrk="1" latinLnBrk="0" hangingPunct="1">
+              <a:lnSpc>
+                <a:spcPct val="90000"/>
+              </a:lnSpc>
+              <a:spcBef>
+                <a:spcPts val="500"/>
+              </a:spcBef>
+              <a:buFont typeface="Arial" panose="020B0604020202020204" pitchFamily="34" charset="0"/>
+              <a:buNone/>
+              <a:defRPr sz="1600" kern="1200">
+                <a:solidFill>
+                  <a:schemeClr val="tx1"/>
+                </a:solidFill>
+                <a:latin typeface="+mn-lt"/>
+                <a:ea typeface="+mn-ea"/>
+                <a:cs typeface="+mn-cs"/>
+              </a:defRPr>
+            </a:lvl6pPr>
+            <a:lvl7pPr marL="2743200" indent="0" algn="ctr" defTabSz="914400" rtl="0" eaLnBrk="1" latinLnBrk="0" hangingPunct="1">
+              <a:lnSpc>
+                <a:spcPct val="90000"/>
+              </a:lnSpc>
+              <a:spcBef>
+                <a:spcPts val="500"/>
+              </a:spcBef>
+              <a:buFont typeface="Arial" panose="020B0604020202020204" pitchFamily="34" charset="0"/>
+              <a:buNone/>
+              <a:defRPr sz="1600" kern="1200">
+                <a:solidFill>
+                  <a:schemeClr val="tx1"/>
+                </a:solidFill>
+                <a:latin typeface="+mn-lt"/>
+                <a:ea typeface="+mn-ea"/>
+                <a:cs typeface="+mn-cs"/>
+              </a:defRPr>
+            </a:lvl7pPr>
+            <a:lvl8pPr marL="3200400" indent="0" algn="ctr" defTabSz="914400" rtl="0" eaLnBrk="1" latinLnBrk="0" hangingPunct="1">
+              <a:lnSpc>
+                <a:spcPct val="90000"/>
+              </a:lnSpc>
+              <a:spcBef>
+                <a:spcPts val="500"/>
+              </a:spcBef>
+              <a:buFont typeface="Arial" panose="020B0604020202020204" pitchFamily="34" charset="0"/>
+              <a:buNone/>
+              <a:defRPr sz="1600" kern="1200">
+                <a:solidFill>
+                  <a:schemeClr val="tx1"/>
+                </a:solidFill>
+                <a:latin typeface="+mn-lt"/>
+                <a:ea typeface="+mn-ea"/>
+                <a:cs typeface="+mn-cs"/>
+              </a:defRPr>
+            </a:lvl8pPr>
+            <a:lvl9pPr marL="3657600" indent="0" algn="ctr" defTabSz="914400" rtl="0" eaLnBrk="1" latinLnBrk="0" hangingPunct="1">
+              <a:lnSpc>
+                <a:spcPct val="90000"/>
+              </a:lnSpc>
+              <a:spcBef>
+                <a:spcPts val="500"/>
+              </a:spcBef>
+              <a:buFont typeface="Arial" panose="020B0604020202020204" pitchFamily="34" charset="0"/>
+              <a:buNone/>
+              <a:defRPr sz="1600" kern="1200">
+                <a:solidFill>
+                  <a:schemeClr val="tx1"/>
+                </a:solidFill>
+                <a:latin typeface="+mn-lt"/>
+                <a:ea typeface="+mn-ea"/>
+                <a:cs typeface="+mn-cs"/>
+              </a:defRPr>
+            </a:lvl9pPr>
+          </a:lstStyle>
+          <a:p>
+            <a:r>
+              <a:rPr lang="fr-FR" b="1" dirty="0"/>
+              <a:t>Kellian CIPIERRE</a:t>
+            </a:r>
+          </a:p>
+        </p:txBody>
+      </p:sp>
+    </p:spTree>
+    <p:extLst>
+      <p:ext uri="{BB962C8B-B14F-4D97-AF65-F5344CB8AC3E}">
+        <p14:creationId xmlns:p14="http://schemas.microsoft.com/office/powerpoint/2010/main" val="2227109878"/>
+      </p:ext>
+    </p:extLst>
+  </p:cSld>
+  <p:clrMapOvr>
+    <a:masterClrMapping/>
+  </p:clrMapOvr>
+  <mc:AlternateContent xmlns:mc="http://schemas.openxmlformats.org/markup-compatibility/2006" xmlns:p14="http://schemas.microsoft.com/office/powerpoint/2010/main">
+    <mc:Choice Requires="p14">
+      <p:transition spd="med" p14:dur="700">
+        <p:fade/>
+      </p:transition>
+    </mc:Choice>
+    <mc:Fallback xmlns="">
+      <p:transition spd="med">
+        <p:fade/>
+      </p:transition>
+    </mc:Fallback>
+  </mc:AlternateContent>
+</p:sld>
+</file>
+
+<file path=ppt/slides/slide2.xml><?xml version="1.0" encoding="utf-8"?>
+<p:sld xmlns:a="http://schemas.openxmlformats.org/drawingml/2006/main" xmlns:r="http://schemas.openxmlformats.org/officeDocument/2006/relationships" xmlns:p="http://schemas.openxmlformats.org/presentationml/2006/main">
+  <p:cSld>
+    <p:spTree>
+      <p:nvGrpSpPr>
+        <p:cNvPr id="1" name=""/>
+        <p:cNvGrpSpPr/>
+        <p:nvPr/>
+      </p:nvGrpSpPr>
+      <p:grpSpPr>
+        <a:xfrm>
+          <a:off x="0" y="0"/>
+          <a:ext cx="0" cy="0"/>
+          <a:chOff x="0" y="0"/>
+          <a:chExt cx="0" cy="0"/>
+        </a:xfrm>
+      </p:grpSpPr>
+      <p:pic>
+        <p:nvPicPr>
+          <p:cNvPr id="17" name="Image 16" descr="Une image contenant bâtiment, cité, grand, assis&#10;&#10;Description générée automatiquement">
+            <a:extLst>
+              <a:ext uri="{FF2B5EF4-FFF2-40B4-BE49-F238E27FC236}">
+                <a16:creationId xmlns:a16="http://schemas.microsoft.com/office/drawing/2014/main" id="{6CF04101-E0D4-4105-A8F6-73217A3E211B}"/>
+              </a:ext>
+            </a:extLst>
+          </p:cNvPr>
+          <p:cNvPicPr>
+            <a:picLocks noChangeAspect="1"/>
+          </p:cNvPicPr>
+          <p:nvPr/>
+        </p:nvPicPr>
+        <p:blipFill>
+          <a:blip r:embed="rId2">
+            <a:extLst>
+              <a:ext uri="{28A0092B-C50C-407E-A947-70E740481C1C}">
+                <a14:useLocalDpi xmlns:a14="http://schemas.microsoft.com/office/drawing/2010/main" val="0"/>
+              </a:ext>
+            </a:extLst>
+          </a:blip>
+          <a:stretch>
+            <a:fillRect/>
+          </a:stretch>
+        </p:blipFill>
+        <p:spPr>
+          <a:xfrm>
+            <a:off x="0" y="0"/>
+            <a:ext cx="12192000" cy="6868732"/>
+          </a:xfrm>
+          <a:prstGeom prst="rect">
+            <a:avLst/>
+          </a:prstGeom>
+        </p:spPr>
+      </p:pic>
+      <p:sp>
+        <p:nvSpPr>
+          <p:cNvPr id="2" name="Titre 1">
+            <a:extLst>
+              <a:ext uri="{FF2B5EF4-FFF2-40B4-BE49-F238E27FC236}">
+                <a16:creationId xmlns:a16="http://schemas.microsoft.com/office/drawing/2014/main" id="{461C7968-4A46-4689-AB1E-51CA29617B56}"/>
+              </a:ext>
+            </a:extLst>
+          </p:cNvPr>
+          <p:cNvSpPr>
+            <a:spLocks noGrp="1"/>
+          </p:cNvSpPr>
+          <p:nvPr>
+            <p:ph type="ctrTitle"/>
+          </p:nvPr>
+        </p:nvSpPr>
+        <p:spPr>
+          <a:xfrm>
+            <a:off x="1" y="106868"/>
+            <a:ext cx="3926048" cy="2770555"/>
+          </a:xfrm>
+        </p:spPr>
+        <p:txBody>
+          <a:bodyPr>
+            <a:normAutofit fontScale="90000"/>
+          </a:bodyPr>
+          <a:lstStyle/>
+          <a:p>
+            <a:r>
+              <a:rPr lang="en-GB" sz="5400" b="1" dirty="0">
+                <a:solidFill>
+                  <a:srgbClr val="FF0000"/>
+                </a:solidFill>
+                <a:latin typeface="+mn-lt"/>
+                <a:cs typeface="Times New Roman" panose="02020603050405020304" pitchFamily="18" charset="0"/>
+              </a:rPr>
+              <a:t>3D Game</a:t>
+            </a:r>
+            <a:br>
+              <a:rPr lang="en-GB" sz="5400" b="1" dirty="0">
+                <a:solidFill>
+                  <a:srgbClr val="FF0000"/>
+                </a:solidFill>
+                <a:latin typeface="+mn-lt"/>
+                <a:cs typeface="Times New Roman" panose="02020603050405020304" pitchFamily="18" charset="0"/>
+              </a:rPr>
+            </a:br>
+            <a:r>
+              <a:rPr lang="en-GB" sz="5400" b="1" dirty="0">
+                <a:solidFill>
+                  <a:srgbClr val="FF0000"/>
+                </a:solidFill>
+                <a:latin typeface="+mn-lt"/>
+                <a:cs typeface="Times New Roman" panose="02020603050405020304" pitchFamily="18" charset="0"/>
+              </a:rPr>
+              <a:t>Action</a:t>
+            </a:r>
+            <a:br>
+              <a:rPr lang="en-GB" sz="5400" b="1" dirty="0">
+                <a:solidFill>
+                  <a:srgbClr val="FF0000"/>
+                </a:solidFill>
+                <a:latin typeface="+mn-lt"/>
+                <a:cs typeface="Times New Roman" panose="02020603050405020304" pitchFamily="18" charset="0"/>
+              </a:rPr>
+            </a:br>
+            <a:r>
+              <a:rPr lang="en-GB" sz="5400" b="1" dirty="0">
+                <a:solidFill>
+                  <a:srgbClr val="FF0000"/>
+                </a:solidFill>
+                <a:latin typeface="+mn-lt"/>
+                <a:cs typeface="Times New Roman" panose="02020603050405020304" pitchFamily="18" charset="0"/>
+              </a:rPr>
+              <a:t>Adventure</a:t>
+            </a:r>
+            <a:br>
+              <a:rPr lang="en-GB" sz="5400" b="1" dirty="0">
+                <a:solidFill>
+                  <a:srgbClr val="FF0000"/>
+                </a:solidFill>
+                <a:latin typeface="+mn-lt"/>
+                <a:cs typeface="Times New Roman" panose="02020603050405020304" pitchFamily="18" charset="0"/>
+              </a:rPr>
+            </a:br>
+            <a:r>
+              <a:rPr lang="en-GB" sz="5400" b="1" dirty="0">
+                <a:solidFill>
+                  <a:srgbClr val="FF0000"/>
+                </a:solidFill>
+                <a:latin typeface="+mn-lt"/>
+                <a:cs typeface="Times New Roman" panose="02020603050405020304" pitchFamily="18" charset="0"/>
+              </a:rPr>
+              <a:t>Beat Them All</a:t>
+            </a:r>
+          </a:p>
+        </p:txBody>
+      </p:sp>
+      <p:pic>
+        <p:nvPicPr>
+          <p:cNvPr id="6" name="Image 5" descr="Une image contenant sombre, allumé, ordinateur, assis&#10;&#10;Description générée automatiquement">
+            <a:extLst>
+              <a:ext uri="{FF2B5EF4-FFF2-40B4-BE49-F238E27FC236}">
+                <a16:creationId xmlns:a16="http://schemas.microsoft.com/office/drawing/2014/main" id="{242F028D-F426-4A1D-A3E8-06B1E5B1BEC9}"/>
+              </a:ext>
+            </a:extLst>
+          </p:cNvPr>
+          <p:cNvPicPr>
+            <a:picLocks noChangeAspect="1"/>
+          </p:cNvPicPr>
+          <p:nvPr/>
+        </p:nvPicPr>
+        <p:blipFill>
+          <a:blip r:embed="rId3">
+            <a:extLst>
+              <a:ext uri="{28A0092B-C50C-407E-A947-70E740481C1C}">
+                <a14:useLocalDpi xmlns:a14="http://schemas.microsoft.com/office/drawing/2010/main" val="0"/>
+              </a:ext>
+            </a:extLst>
+          </a:blip>
+          <a:stretch>
+            <a:fillRect/>
+          </a:stretch>
+        </p:blipFill>
+        <p:spPr>
+          <a:xfrm>
+            <a:off x="7287208" y="242207"/>
+            <a:ext cx="4430486" cy="1609743"/>
+          </a:xfrm>
+          <a:prstGeom prst="rect">
+            <a:avLst/>
+          </a:prstGeom>
+        </p:spPr>
+      </p:pic>
+    </p:spTree>
+    <p:extLst>
+      <p:ext uri="{BB962C8B-B14F-4D97-AF65-F5344CB8AC3E}">
+        <p14:creationId xmlns:p14="http://schemas.microsoft.com/office/powerpoint/2010/main" val="3994157654"/>
+      </p:ext>
+    </p:extLst>
+  </p:cSld>
+  <p:clrMapOvr>
+    <a:masterClrMapping/>
+  </p:clrMapOvr>
+  <mc:AlternateContent xmlns:mc="http://schemas.openxmlformats.org/markup-compatibility/2006" xmlns:p159="http://schemas.microsoft.com/office/powerpoint/2015/09/main">
+    <mc:Choice Requires="p159">
+      <p:transition xmlns:p14="http://schemas.microsoft.com/office/powerpoint/2010/main" spd="slow" p14:dur="2000">
+        <p159:morph option="byObject"/>
+      </p:transition>
+    </mc:Choice>
+    <mc:Fallback xmlns="">
+      <p:transition spd="slow">
+        <p:fade/>
+      </p:transition>
+    </mc:Fallback>
+  </mc:AlternateContent>
+</p:sld>
+</file>
+
+<file path=ppt/slides/slide3.xml><?xml version="1.0" encoding="utf-8"?>
+<p:sld xmlns:a="http://schemas.openxmlformats.org/drawingml/2006/main" xmlns:r="http://schemas.openxmlformats.org/officeDocument/2006/relationships" xmlns:p="http://schemas.openxmlformats.org/presentationml/2006/main">
+  <p:cSld>
+    <p:bg>
+      <p:bgPr>
+        <a:solidFill>
+          <a:schemeClr val="bg1"/>
+        </a:solidFill>
+        <a:effectLst/>
+      </p:bgPr>
+    </p:bg>
+    <p:spTree>
+      <p:nvGrpSpPr>
+        <p:cNvPr id="1" name=""/>
+        <p:cNvGrpSpPr/>
+        <p:nvPr/>
+      </p:nvGrpSpPr>
+      <p:grpSpPr>
+        <a:xfrm>
+          <a:off x="0" y="0"/>
+          <a:ext cx="0" cy="0"/>
+          <a:chOff x="0" y="0"/>
+          <a:chExt cx="0" cy="0"/>
+        </a:xfrm>
+      </p:grpSpPr>
+      <p:pic>
+        <p:nvPicPr>
+          <p:cNvPr id="14" name="Image 13" descr="Une image contenant capture d’écran, ordinateur&#10;&#10;Description générée automatiquement">
+            <a:extLst>
+              <a:ext uri="{FF2B5EF4-FFF2-40B4-BE49-F238E27FC236}">
+                <a16:creationId xmlns:a16="http://schemas.microsoft.com/office/drawing/2014/main" id="{C195D4D0-27DC-4CA5-8AF6-42E817F86C32}"/>
+              </a:ext>
+            </a:extLst>
+          </p:cNvPr>
+          <p:cNvPicPr>
+            <a:picLocks noChangeAspect="1"/>
+          </p:cNvPicPr>
+          <p:nvPr/>
+        </p:nvPicPr>
+        <p:blipFill rotWithShape="1">
+          <a:blip r:embed="rId2">
+            <a:extLst>
+              <a:ext uri="{28A0092B-C50C-407E-A947-70E740481C1C}">
+                <a14:useLocalDpi xmlns:a14="http://schemas.microsoft.com/office/drawing/2010/main" val="0"/>
+              </a:ext>
+            </a:extLst>
+          </a:blip>
+          <a:srcRect l="8339" r="24994"/>
+          <a:stretch/>
+        </p:blipFill>
+        <p:spPr>
+          <a:xfrm>
+            <a:off x="20" y="10"/>
+            <a:ext cx="6095980" cy="6857990"/>
+          </a:xfrm>
+          <a:prstGeom prst="rect">
+            <a:avLst/>
+          </a:prstGeom>
+        </p:spPr>
+      </p:pic>
+      <p:pic>
+        <p:nvPicPr>
+          <p:cNvPr id="9" name="Image 8" descr="Une image contenant ordinateur, dessin, table&#10;&#10;Description générée automatiquement">
+            <a:extLst>
+              <a:ext uri="{FF2B5EF4-FFF2-40B4-BE49-F238E27FC236}">
+                <a16:creationId xmlns:a16="http://schemas.microsoft.com/office/drawing/2014/main" id="{FC59685C-EF80-4E38-AAB2-101474804714}"/>
+              </a:ext>
+            </a:extLst>
+          </p:cNvPr>
+          <p:cNvPicPr>
+            <a:picLocks noChangeAspect="1"/>
+          </p:cNvPicPr>
+          <p:nvPr/>
+        </p:nvPicPr>
+        <p:blipFill rotWithShape="1">
+          <a:blip r:embed="rId3">
+            <a:extLst>
+              <a:ext uri="{28A0092B-C50C-407E-A947-70E740481C1C}">
+                <a14:useLocalDpi xmlns:a14="http://schemas.microsoft.com/office/drawing/2010/main" val="0"/>
+              </a:ext>
+            </a:extLst>
+          </a:blip>
+          <a:srcRect l="21659" r="28341"/>
+          <a:stretch/>
+        </p:blipFill>
+        <p:spPr>
+          <a:xfrm>
+            <a:off x="6096000" y="10"/>
+            <a:ext cx="6096000" cy="6857990"/>
+          </a:xfrm>
+          <a:prstGeom prst="rect">
+            <a:avLst/>
+          </a:prstGeom>
+        </p:spPr>
+      </p:pic>
+    </p:spTree>
+    <p:extLst>
+      <p:ext uri="{BB962C8B-B14F-4D97-AF65-F5344CB8AC3E}">
+        <p14:creationId xmlns:p14="http://schemas.microsoft.com/office/powerpoint/2010/main" val="36303002"/>
+      </p:ext>
+    </p:extLst>
+  </p:cSld>
+  <p:clrMapOvr>
+    <a:masterClrMapping/>
+  </p:clrMapOvr>
+  <mc:AlternateContent xmlns:mc="http://schemas.openxmlformats.org/markup-compatibility/2006" xmlns:p14="http://schemas.microsoft.com/office/powerpoint/2010/main">
+    <mc:Choice Requires="p14">
+      <p:transition spd="med" p14:dur="700">
+        <p:fade/>
+      </p:transition>
+    </mc:Choice>
+    <mc:Fallback xmlns="">
+      <p:transition spd="med">
+        <p:fade/>
+      </p:transition>
+    </mc:Fallback>
+  </mc:AlternateContent>
+</p:sld>
+</file>
+
+<file path=ppt/slides/slide4.xml><?xml version="1.0" encoding="utf-8"?>
+<p:sld xmlns:a="http://schemas.openxmlformats.org/drawingml/2006/main" xmlns:r="http://schemas.openxmlformats.org/officeDocument/2006/relationships" xmlns:p="http://schemas.openxmlformats.org/presentationml/2006/main">
+  <p:cSld>
+    <p:bg>
+      <p:bgPr>
+        <a:solidFill>
+          <a:schemeClr val="bg1"/>
+        </a:solidFill>
+        <a:effectLst/>
+      </p:bgPr>
+    </p:bg>
+    <p:spTree>
+      <p:nvGrpSpPr>
+        <p:cNvPr id="1" name=""/>
+        <p:cNvGrpSpPr/>
+        <p:nvPr/>
+      </p:nvGrpSpPr>
+      <p:grpSpPr>
+        <a:xfrm>
+          <a:off x="0" y="0"/>
+          <a:ext cx="0" cy="0"/>
+          <a:chOff x="0" y="0"/>
+          <a:chExt cx="0" cy="0"/>
+        </a:xfrm>
+      </p:grpSpPr>
+      <p:pic>
+        <p:nvPicPr>
+          <p:cNvPr id="4" name="Image 3" descr="Une image contenant horloge, objet, signe&#10;&#10;Description générée automatiquement">
+            <a:extLst>
+              <a:ext uri="{FF2B5EF4-FFF2-40B4-BE49-F238E27FC236}">
+                <a16:creationId xmlns:a16="http://schemas.microsoft.com/office/drawing/2014/main" id="{DB4BCADF-8779-42E3-B6A2-546CE125250D}"/>
+              </a:ext>
+            </a:extLst>
+          </p:cNvPr>
+          <p:cNvPicPr>
+            <a:picLocks noChangeAspect="1"/>
+          </p:cNvPicPr>
+          <p:nvPr/>
+        </p:nvPicPr>
+        <p:blipFill rotWithShape="1">
+          <a:blip r:embed="rId2">
+            <a:extLst>
+              <a:ext uri="{28A0092B-C50C-407E-A947-70E740481C1C}">
+                <a14:useLocalDpi xmlns:a14="http://schemas.microsoft.com/office/drawing/2010/main" val="0"/>
+              </a:ext>
+            </a:extLst>
+          </a:blip>
+          <a:srcRect l="26463" r="24426" b="1"/>
+          <a:stretch/>
+        </p:blipFill>
+        <p:spPr>
+          <a:xfrm>
+            <a:off x="20" y="10"/>
+            <a:ext cx="6095980" cy="6857990"/>
+          </a:xfrm>
+          <a:prstGeom prst="rect">
+            <a:avLst/>
+          </a:prstGeom>
+        </p:spPr>
+      </p:pic>
+      <p:pic>
+        <p:nvPicPr>
+          <p:cNvPr id="6" name="Image 5" descr="Une image contenant horloge, réfrigérateur&#10;&#10;Description générée automatiquement">
+            <a:extLst>
+              <a:ext uri="{FF2B5EF4-FFF2-40B4-BE49-F238E27FC236}">
+                <a16:creationId xmlns:a16="http://schemas.microsoft.com/office/drawing/2014/main" id="{BC3CBA4B-3272-41CB-847A-6F5EEFAC5C27}"/>
+              </a:ext>
+            </a:extLst>
+          </p:cNvPr>
+          <p:cNvPicPr>
+            <a:picLocks noChangeAspect="1"/>
+          </p:cNvPicPr>
+          <p:nvPr/>
+        </p:nvPicPr>
+        <p:blipFill rotWithShape="1">
+          <a:blip r:embed="rId3">
+            <a:extLst>
+              <a:ext uri="{28A0092B-C50C-407E-A947-70E740481C1C}">
+                <a14:useLocalDpi xmlns:a14="http://schemas.microsoft.com/office/drawing/2010/main" val="0"/>
+              </a:ext>
+            </a:extLst>
+          </a:blip>
+          <a:srcRect l="3069" r="8042"/>
+          <a:stretch/>
+        </p:blipFill>
+        <p:spPr>
+          <a:xfrm>
+            <a:off x="6096000" y="10"/>
+            <a:ext cx="6096000" cy="6857990"/>
+          </a:xfrm>
+          <a:prstGeom prst="rect">
+            <a:avLst/>
+          </a:prstGeom>
+        </p:spPr>
+      </p:pic>
+    </p:spTree>
+    <p:extLst>
+      <p:ext uri="{BB962C8B-B14F-4D97-AF65-F5344CB8AC3E}">
+        <p14:creationId xmlns:p14="http://schemas.microsoft.com/office/powerpoint/2010/main" val="2346671218"/>
+      </p:ext>
+    </p:extLst>
+  </p:cSld>
+  <p:clrMapOvr>
+    <a:masterClrMapping/>
+  </p:clrMapOvr>
+  <mc:AlternateContent xmlns:mc="http://schemas.openxmlformats.org/markup-compatibility/2006" xmlns:p14="http://schemas.microsoft.com/office/powerpoint/2010/main">
+    <mc:Choice Requires="p14">
+      <p:transition spd="med" p14:dur="700">
+        <p:fade/>
+      </p:transition>
+    </mc:Choice>
+    <mc:Fallback xmlns="">
+      <p:transition spd="med">
+        <p:fade/>
+      </p:transition>
+    </mc:Fallback>
+  </mc:AlternateContent>
+</p:sld>
+</file>
+
+<file path=ppt/slides/slide5.xml><?xml version="1.0" encoding="utf-8"?>
+<p:sld xmlns:a="http://schemas.openxmlformats.org/drawingml/2006/main" xmlns:r="http://schemas.openxmlformats.org/officeDocument/2006/relationships" xmlns:p="http://schemas.openxmlformats.org/presentationml/2006/main">
+  <p:cSld>
+    <p:bg>
+      <p:bgPr>
+        <a:solidFill>
+          <a:schemeClr val="bg1"/>
+        </a:solidFill>
+        <a:effectLst/>
+      </p:bgPr>
+    </p:bg>
+    <p:spTree>
+      <p:nvGrpSpPr>
+        <p:cNvPr id="1" name=""/>
+        <p:cNvGrpSpPr/>
+        <p:nvPr/>
+      </p:nvGrpSpPr>
+      <p:grpSpPr>
+        <a:xfrm>
+          <a:off x="0" y="0"/>
+          <a:ext cx="0" cy="0"/>
+          <a:chOff x="0" y="0"/>
+          <a:chExt cx="0" cy="0"/>
+        </a:xfrm>
+      </p:grpSpPr>
+      <p:pic>
+        <p:nvPicPr>
+          <p:cNvPr id="2052" name="Picture 4" descr="Image result for office employee bullied cartoon&quot;">
+            <a:extLst>
+              <a:ext uri="{FF2B5EF4-FFF2-40B4-BE49-F238E27FC236}">
+                <a16:creationId xmlns:a16="http://schemas.microsoft.com/office/drawing/2014/main" id="{513FC5CD-D668-4408-97F8-85ED24B0CD61}"/>
+              </a:ext>
+            </a:extLst>
+          </p:cNvPr>
+          <p:cNvPicPr>
+            <a:picLocks noChangeAspect="1" noChangeArrowheads="1"/>
+          </p:cNvPicPr>
+          <p:nvPr/>
+        </p:nvPicPr>
+        <p:blipFill rotWithShape="1">
+          <a:blip r:embed="rId2">
+            <a:extLst>
+              <a:ext uri="{28A0092B-C50C-407E-A947-70E740481C1C}">
+                <a14:useLocalDpi xmlns:a14="http://schemas.microsoft.com/office/drawing/2010/main" val="0"/>
+              </a:ext>
+            </a:extLst>
+          </a:blip>
+          <a:srcRect t="6961" b="11221"/>
+          <a:stretch/>
+        </p:blipFill>
+        <p:spPr bwMode="auto">
+          <a:xfrm>
+            <a:off x="20" y="10"/>
+            <a:ext cx="12191980" cy="6857990"/>
+          </a:xfrm>
+          <a:prstGeom prst="rect">
+            <a:avLst/>
+          </a:prstGeom>
+          <a:noFill/>
+          <a:extLst>
+            <a:ext uri="{909E8E84-426E-40DD-AFC4-6F175D3DCCD1}">
+              <a14:hiddenFill xmlns:a14="http://schemas.microsoft.com/office/drawing/2010/main">
+                <a:solidFill>
+                  <a:srgbClr val="FFFFFF"/>
+                </a:solidFill>
+              </a14:hiddenFill>
+            </a:ext>
+          </a:extLst>
+        </p:spPr>
+      </p:pic>
+    </p:spTree>
+    <p:extLst>
+      <p:ext uri="{BB962C8B-B14F-4D97-AF65-F5344CB8AC3E}">
+        <p14:creationId xmlns:p14="http://schemas.microsoft.com/office/powerpoint/2010/main" val="3931550703"/>
+      </p:ext>
+    </p:extLst>
+  </p:cSld>
+  <p:clrMapOvr>
+    <a:masterClrMapping/>
+  </p:clrMapOvr>
+  <mc:AlternateContent xmlns:mc="http://schemas.openxmlformats.org/markup-compatibility/2006" xmlns:p14="http://schemas.microsoft.com/office/powerpoint/2010/main">
+    <mc:Choice Requires="p14">
+      <p:transition spd="med" p14:dur="700">
+        <p:fade/>
+      </p:transition>
+    </mc:Choice>
+    <mc:Fallback xmlns="">
+      <p:transition spd="med">
+        <p:fade/>
+      </p:transition>
+    </mc:Fallback>
+  </mc:AlternateContent>
+</p:sld>
+</file>
+
+<file path=ppt/slides/slide6.xml><?xml version="1.0" encoding="utf-8"?>
+<p:sld xmlns:a="http://schemas.openxmlformats.org/drawingml/2006/main" xmlns:r="http://schemas.openxmlformats.org/officeDocument/2006/relationships" xmlns:p="http://schemas.openxmlformats.org/presentationml/2006/main">
+  <p:cSld>
+    <p:bg>
+      <p:bgPr>
+        <a:solidFill>
+          <a:schemeClr val="bg1"/>
+        </a:solidFill>
+        <a:effectLst/>
+      </p:bgPr>
+    </p:bg>
+    <p:spTree>
+      <p:nvGrpSpPr>
+        <p:cNvPr id="1" name=""/>
+        <p:cNvGrpSpPr/>
+        <p:nvPr/>
+      </p:nvGrpSpPr>
+      <p:grpSpPr>
+        <a:xfrm>
+          <a:off x="0" y="0"/>
+          <a:ext cx="0" cy="0"/>
+          <a:chOff x="0" y="0"/>
+          <a:chExt cx="0" cy="0"/>
+        </a:xfrm>
+      </p:grpSpPr>
+      <p:pic>
+        <p:nvPicPr>
+          <p:cNvPr id="1028" name="Picture 4" descr="Image result for office employee crazy cartoon&quot;">
+            <a:extLst>
+              <a:ext uri="{FF2B5EF4-FFF2-40B4-BE49-F238E27FC236}">
+                <a16:creationId xmlns:a16="http://schemas.microsoft.com/office/drawing/2014/main" id="{D0F43370-35A2-408A-941A-0012759E48FA}"/>
+              </a:ext>
+            </a:extLst>
+          </p:cNvPr>
+          <p:cNvPicPr>
+            <a:picLocks noChangeAspect="1" noChangeArrowheads="1"/>
+          </p:cNvPicPr>
+          <p:nvPr/>
+        </p:nvPicPr>
+        <p:blipFill>
+          <a:blip r:embed="rId2">
+            <a:extLst>
+              <a:ext uri="{28A0092B-C50C-407E-A947-70E740481C1C}">
+                <a14:useLocalDpi xmlns:a14="http://schemas.microsoft.com/office/drawing/2010/main" val="0"/>
+              </a:ext>
+            </a:extLst>
+          </a:blip>
+          <a:stretch>
+            <a:fillRect/>
+          </a:stretch>
+        </p:blipFill>
+        <p:spPr bwMode="auto">
+          <a:xfrm>
+            <a:off x="970344" y="643467"/>
+            <a:ext cx="4637912" cy="5571066"/>
+          </a:xfrm>
+          <a:prstGeom prst="rect">
+            <a:avLst/>
+          </a:prstGeom>
+          <a:noFill/>
+          <a:extLst>
+            <a:ext uri="{909E8E84-426E-40DD-AFC4-6F175D3DCCD1}">
+              <a14:hiddenFill xmlns:a14="http://schemas.microsoft.com/office/drawing/2010/main">
+                <a:solidFill>
+                  <a:srgbClr val="FFFFFF"/>
+                </a:solidFill>
+              </a14:hiddenFill>
+            </a:ext>
+          </a:extLst>
+        </p:spPr>
+      </p:pic>
+      <p:pic>
+        <p:nvPicPr>
+          <p:cNvPr id="1026" name="Picture 2" descr="Image result for office employee crazy cartoon&quot;">
+            <a:extLst>
+              <a:ext uri="{FF2B5EF4-FFF2-40B4-BE49-F238E27FC236}">
+                <a16:creationId xmlns:a16="http://schemas.microsoft.com/office/drawing/2014/main" id="{916B2909-7B3B-416A-9E8B-7D69104FC758}"/>
+              </a:ext>
+            </a:extLst>
+          </p:cNvPr>
+          <p:cNvPicPr>
+            <a:picLocks noChangeAspect="1" noChangeArrowheads="1"/>
+          </p:cNvPicPr>
+          <p:nvPr/>
+        </p:nvPicPr>
+        <p:blipFill>
+          <a:blip r:embed="rId3">
+            <a:extLst>
+              <a:ext uri="{28A0092B-C50C-407E-A947-70E740481C1C}">
+                <a14:useLocalDpi xmlns:a14="http://schemas.microsoft.com/office/drawing/2010/main" val="0"/>
+              </a:ext>
+            </a:extLst>
+          </a:blip>
+          <a:stretch>
+            <a:fillRect/>
+          </a:stretch>
+        </p:blipFill>
+        <p:spPr bwMode="auto">
+          <a:xfrm>
+            <a:off x="6256865" y="974990"/>
+            <a:ext cx="5291667" cy="4908020"/>
+          </a:xfrm>
+          <a:prstGeom prst="rect">
+            <a:avLst/>
+          </a:prstGeom>
+          <a:noFill/>
+          <a:extLst>
+            <a:ext uri="{909E8E84-426E-40DD-AFC4-6F175D3DCCD1}">
+              <a14:hiddenFill xmlns:a14="http://schemas.microsoft.com/office/drawing/2010/main">
+                <a:solidFill>
+                  <a:srgbClr val="FFFFFF"/>
+                </a:solidFill>
+              </a14:hiddenFill>
+            </a:ext>
+          </a:extLst>
+        </p:spPr>
+      </p:pic>
+    </p:spTree>
+    <p:extLst>
+      <p:ext uri="{BB962C8B-B14F-4D97-AF65-F5344CB8AC3E}">
+        <p14:creationId xmlns:p14="http://schemas.microsoft.com/office/powerpoint/2010/main" val="4115067164"/>
+      </p:ext>
+    </p:extLst>
+  </p:cSld>
+  <p:clrMapOvr>
+    <a:masterClrMapping/>
+  </p:clrMapOvr>
+  <mc:AlternateContent xmlns:mc="http://schemas.openxmlformats.org/markup-compatibility/2006" xmlns:p14="http://schemas.microsoft.com/office/powerpoint/2010/main">
+    <mc:Choice Requires="p14">
+      <p:transition spd="med" p14:dur="700">
+        <p:fade/>
+      </p:transition>
+    </mc:Choice>
+    <mc:Fallback xmlns="">
+      <p:transition spd="med">
+        <p:fade/>
+      </p:transition>
+    </mc:Fallback>
+  </mc:AlternateContent>
+</p:sld>
+</file>
+
+<file path=ppt/slides/slide7.xml><?xml version="1.0" encoding="utf-8"?>
+<p:sld xmlns:a="http://schemas.openxmlformats.org/drawingml/2006/main" xmlns:r="http://schemas.openxmlformats.org/officeDocument/2006/relationships" xmlns:p="http://schemas.openxmlformats.org/presentationml/2006/main">
+  <p:cSld>
+    <p:bg>
+      <p:bgPr>
+        <a:solidFill>
+          <a:schemeClr val="bg1"/>
+        </a:solidFill>
+        <a:effectLst/>
+      </p:bgPr>
+    </p:bg>
+    <p:spTree>
+      <p:nvGrpSpPr>
+        <p:cNvPr id="1" name=""/>
+        <p:cNvGrpSpPr/>
+        <p:nvPr/>
+      </p:nvGrpSpPr>
+      <p:grpSpPr>
+        <a:xfrm>
+          <a:off x="0" y="0"/>
+          <a:ext cx="0" cy="0"/>
+          <a:chOff x="0" y="0"/>
+          <a:chExt cx="0" cy="0"/>
+        </a:xfrm>
+      </p:grpSpPr>
+      <p:pic>
+        <p:nvPicPr>
+          <p:cNvPr id="8" name="Image 7" descr="Une image contenant table, pièce, ordinateur, compteur&#10;&#10;Description générée automatiquement">
+            <a:extLst>
+              <a:ext uri="{FF2B5EF4-FFF2-40B4-BE49-F238E27FC236}">
+                <a16:creationId xmlns:a16="http://schemas.microsoft.com/office/drawing/2014/main" id="{F0248986-8C8E-4A50-8D14-A4E4BB999EFB}"/>
+              </a:ext>
+            </a:extLst>
+          </p:cNvPr>
+          <p:cNvPicPr>
+            <a:picLocks noChangeAspect="1"/>
+          </p:cNvPicPr>
+          <p:nvPr/>
+        </p:nvPicPr>
+        <p:blipFill rotWithShape="1">
+          <a:blip r:embed="rId2">
+            <a:extLst>
+              <a:ext uri="{28A0092B-C50C-407E-A947-70E740481C1C}">
+                <a14:useLocalDpi xmlns:a14="http://schemas.microsoft.com/office/drawing/2010/main" val="0"/>
+              </a:ext>
+            </a:extLst>
+          </a:blip>
+          <a:srcRect t="11919" b="8576"/>
+          <a:stretch/>
+        </p:blipFill>
+        <p:spPr>
+          <a:xfrm>
+            <a:off x="20" y="10"/>
+            <a:ext cx="12191980" cy="6857990"/>
+          </a:xfrm>
+          <a:prstGeom prst="rect">
+            <a:avLst/>
+          </a:prstGeom>
+        </p:spPr>
+      </p:pic>
+      <p:pic>
+        <p:nvPicPr>
+          <p:cNvPr id="10" name="Image 9">
+            <a:extLst>
+              <a:ext uri="{FF2B5EF4-FFF2-40B4-BE49-F238E27FC236}">
+                <a16:creationId xmlns:a16="http://schemas.microsoft.com/office/drawing/2014/main" id="{FAAA65C8-2AA9-4725-BD45-C03570CA42D4}"/>
+              </a:ext>
+            </a:extLst>
+          </p:cNvPr>
+          <p:cNvPicPr>
+            <a:picLocks noChangeAspect="1"/>
+          </p:cNvPicPr>
+          <p:nvPr/>
+        </p:nvPicPr>
+        <p:blipFill>
+          <a:blip r:embed="rId3">
+            <a:extLst>
+              <a:ext uri="{28A0092B-C50C-407E-A947-70E740481C1C}">
+                <a14:useLocalDpi xmlns:a14="http://schemas.microsoft.com/office/drawing/2010/main" val="0"/>
+              </a:ext>
+            </a:extLst>
+          </a:blip>
+          <a:stretch>
+            <a:fillRect/>
+          </a:stretch>
+        </p:blipFill>
+        <p:spPr>
+          <a:xfrm>
+            <a:off x="1968759" y="4451955"/>
+            <a:ext cx="597159" cy="442271"/>
+          </a:xfrm>
+          <a:prstGeom prst="rect">
+            <a:avLst/>
+          </a:prstGeom>
+        </p:spPr>
+      </p:pic>
+    </p:spTree>
+    <p:extLst>
+      <p:ext uri="{BB962C8B-B14F-4D97-AF65-F5344CB8AC3E}">
+        <p14:creationId xmlns:p14="http://schemas.microsoft.com/office/powerpoint/2010/main" val="2949534445"/>
+      </p:ext>
+    </p:extLst>
+  </p:cSld>
+  <p:clrMapOvr>
+    <a:masterClrMapping/>
+  </p:clrMapOvr>
+  <mc:AlternateContent xmlns:mc="http://schemas.openxmlformats.org/markup-compatibility/2006" xmlns:p14="http://schemas.microsoft.com/office/powerpoint/2010/main">
+    <mc:Choice Requires="p14">
+      <p:transition spd="med" p14:dur="700">
+        <p:fade/>
+      </p:transition>
+    </mc:Choice>
+    <mc:Fallback xmlns="">
+      <p:transition spd="med">
+        <p:fade/>
+      </p:transition>
+    </mc:Fallback>
+  </mc:AlternateContent>
+</p:sld>
+</file>
+
+<file path=ppt/slides/slide8.xml><?xml version="1.0" encoding="utf-8"?>
+<p:sld xmlns:a="http://schemas.openxmlformats.org/drawingml/2006/main" xmlns:r="http://schemas.openxmlformats.org/officeDocument/2006/relationships" xmlns:p="http://schemas.openxmlformats.org/presentationml/2006/main">
+  <p:cSld>
+    <p:bg>
+      <p:bgPr>
+        <a:solidFill>
+          <a:schemeClr val="bg1"/>
+        </a:solidFill>
+        <a:effectLst/>
+      </p:bgPr>
+    </p:bg>
+    <p:spTree>
+      <p:nvGrpSpPr>
+        <p:cNvPr id="1" name=""/>
+        <p:cNvGrpSpPr/>
+        <p:nvPr/>
+      </p:nvGrpSpPr>
+      <p:grpSpPr>
+        <a:xfrm>
+          <a:off x="0" y="0"/>
+          <a:ext cx="0" cy="0"/>
+          <a:chOff x="0" y="0"/>
+          <a:chExt cx="0" cy="0"/>
+        </a:xfrm>
+      </p:grpSpPr>
+      <p:pic>
+        <p:nvPicPr>
+          <p:cNvPr id="8" name="Image 7" descr="Une image contenant table, pièce, ordinateur, compteur&#10;&#10;Description générée automatiquement">
+            <a:extLst>
+              <a:ext uri="{FF2B5EF4-FFF2-40B4-BE49-F238E27FC236}">
+                <a16:creationId xmlns:a16="http://schemas.microsoft.com/office/drawing/2014/main" id="{F0248986-8C8E-4A50-8D14-A4E4BB999EFB}"/>
+              </a:ext>
+            </a:extLst>
+          </p:cNvPr>
+          <p:cNvPicPr>
+            <a:picLocks noChangeAspect="1"/>
+          </p:cNvPicPr>
+          <p:nvPr/>
+        </p:nvPicPr>
+        <p:blipFill rotWithShape="1">
+          <a:blip r:embed="rId2">
+            <a:extLst>
+              <a:ext uri="{28A0092B-C50C-407E-A947-70E740481C1C}">
+                <a14:useLocalDpi xmlns:a14="http://schemas.microsoft.com/office/drawing/2010/main" val="0"/>
+              </a:ext>
+            </a:extLst>
+          </a:blip>
+          <a:srcRect t="11919" b="8576"/>
+          <a:stretch/>
+        </p:blipFill>
+        <p:spPr>
+          <a:xfrm>
+            <a:off x="20" y="10"/>
+            <a:ext cx="12191980" cy="6857990"/>
+          </a:xfrm>
+          <a:prstGeom prst="rect">
+            <a:avLst/>
+          </a:prstGeom>
+        </p:spPr>
+      </p:pic>
+      <p:pic>
+        <p:nvPicPr>
+          <p:cNvPr id="10" name="Image 9">
+            <a:extLst>
+              <a:ext uri="{FF2B5EF4-FFF2-40B4-BE49-F238E27FC236}">
+                <a16:creationId xmlns:a16="http://schemas.microsoft.com/office/drawing/2014/main" id="{FAAA65C8-2AA9-4725-BD45-C03570CA42D4}"/>
+              </a:ext>
+            </a:extLst>
+          </p:cNvPr>
+          <p:cNvPicPr>
+            <a:picLocks noChangeAspect="1"/>
+          </p:cNvPicPr>
+          <p:nvPr/>
+        </p:nvPicPr>
+        <p:blipFill>
+          <a:blip r:embed="rId3">
+            <a:extLst>
+              <a:ext uri="{28A0092B-C50C-407E-A947-70E740481C1C}">
+                <a14:useLocalDpi xmlns:a14="http://schemas.microsoft.com/office/drawing/2010/main" val="0"/>
+              </a:ext>
+            </a:extLst>
+          </a:blip>
+          <a:stretch>
+            <a:fillRect/>
+          </a:stretch>
+        </p:blipFill>
+        <p:spPr>
+          <a:xfrm>
+            <a:off x="1968759" y="4451955"/>
+            <a:ext cx="597159" cy="442271"/>
+          </a:xfrm>
+          <a:prstGeom prst="rect">
+            <a:avLst/>
+          </a:prstGeom>
+        </p:spPr>
+      </p:pic>
+      <p:pic>
+        <p:nvPicPr>
+          <p:cNvPr id="5" name="Image 4" descr="Une image contenant fleur&#10;&#10;Description générée automatiquement">
+            <a:extLst>
+              <a:ext uri="{FF2B5EF4-FFF2-40B4-BE49-F238E27FC236}">
+                <a16:creationId xmlns:a16="http://schemas.microsoft.com/office/drawing/2014/main" id="{6B9246BD-8CAB-40B0-AEBB-E107882F9482}"/>
+              </a:ext>
+            </a:extLst>
+          </p:cNvPr>
+          <p:cNvPicPr>
+            <a:picLocks noChangeAspect="1"/>
+          </p:cNvPicPr>
+          <p:nvPr/>
+        </p:nvPicPr>
+        <p:blipFill>
+          <a:blip r:embed="rId4">
+            <a:extLst>
+              <a:ext uri="{28A0092B-C50C-407E-A947-70E740481C1C}">
+                <a14:useLocalDpi xmlns:a14="http://schemas.microsoft.com/office/drawing/2010/main" val="0"/>
+              </a:ext>
+            </a:extLst>
+          </a:blip>
+          <a:stretch>
+            <a:fillRect/>
+          </a:stretch>
+        </p:blipFill>
+        <p:spPr>
+          <a:xfrm>
+            <a:off x="2478237" y="1705164"/>
+            <a:ext cx="4361697" cy="4343409"/>
+          </a:xfrm>
+          <a:prstGeom prst="rect">
+            <a:avLst/>
+          </a:prstGeom>
+        </p:spPr>
+      </p:pic>
+      <p:pic>
+        <p:nvPicPr>
+          <p:cNvPr id="7" name="Image 6">
+            <a:extLst>
+              <a:ext uri="{FF2B5EF4-FFF2-40B4-BE49-F238E27FC236}">
+                <a16:creationId xmlns:a16="http://schemas.microsoft.com/office/drawing/2014/main" id="{EE75A5A1-C982-4F8B-BC64-8FC8FA3A21DA}"/>
+              </a:ext>
+            </a:extLst>
+          </p:cNvPr>
+          <p:cNvPicPr>
+            <a:picLocks noChangeAspect="1"/>
+          </p:cNvPicPr>
+          <p:nvPr/>
+        </p:nvPicPr>
+        <p:blipFill>
+          <a:blip r:embed="rId5">
+            <a:extLst>
+              <a:ext uri="{28A0092B-C50C-407E-A947-70E740481C1C}">
+                <a14:useLocalDpi xmlns:a14="http://schemas.microsoft.com/office/drawing/2010/main" val="0"/>
+              </a:ext>
+            </a:extLst>
+          </a:blip>
+          <a:stretch>
+            <a:fillRect/>
+          </a:stretch>
+        </p:blipFill>
+        <p:spPr>
+          <a:xfrm>
+            <a:off x="6839934" y="-309465"/>
+            <a:ext cx="4627387" cy="4627387"/>
+          </a:xfrm>
+          <a:prstGeom prst="rect">
+            <a:avLst/>
+          </a:prstGeom>
+        </p:spPr>
+      </p:pic>
+    </p:spTree>
+    <p:extLst>
+      <p:ext uri="{BB962C8B-B14F-4D97-AF65-F5344CB8AC3E}">
+        <p14:creationId xmlns:p14="http://schemas.microsoft.com/office/powerpoint/2010/main" val="2911778377"/>
+      </p:ext>
+    </p:extLst>
+  </p:cSld>
+  <p:clrMapOvr>
+    <a:masterClrMapping/>
+  </p:clrMapOvr>
+  <mc:AlternateContent xmlns:mc="http://schemas.openxmlformats.org/markup-compatibility/2006" xmlns:p14="http://schemas.microsoft.com/office/powerpoint/2010/main">
+    <mc:Choice Requires="p14">
+      <p:transition spd="med" p14:dur="700">
+        <p:fade/>
+      </p:transition>
+    </mc:Choice>
+    <mc:Fallback xmlns="">
+      <p:transition spd="med">
+        <p:fade/>
+      </p:transition>
+    </mc:Fallback>
+  </mc:AlternateContent>
+</p:sld>
+</file>
+
+<file path=ppt/slides/slide9.xml><?xml version="1.0" encoding="utf-8"?>
+<p:sld xmlns:a="http://schemas.openxmlformats.org/drawingml/2006/main" xmlns:r="http://schemas.openxmlformats.org/officeDocument/2006/relationships" xmlns:p="http://schemas.openxmlformats.org/presentationml/2006/main">
+  <p:cSld>
+    <p:bg>
+      <p:bgPr>
+        <a:solidFill>
+          <a:schemeClr val="bg1"/>
+        </a:solidFill>
+        <a:effectLst/>
+      </p:bgPr>
+    </p:bg>
+    <p:spTree>
+      <p:nvGrpSpPr>
+        <p:cNvPr id="1" name=""/>
+        <p:cNvGrpSpPr/>
+        <p:nvPr/>
+      </p:nvGrpSpPr>
+      <p:grpSpPr>
+        <a:xfrm>
+          <a:off x="0" y="0"/>
+          <a:ext cx="0" cy="0"/>
+          <a:chOff x="0" y="0"/>
+          <a:chExt cx="0" cy="0"/>
+        </a:xfrm>
+      </p:grpSpPr>
+      <p:pic>
+        <p:nvPicPr>
+          <p:cNvPr id="8" name="Image 7" descr="Une image contenant table, pièce, ordinateur, compteur&#10;&#10;Description générée automatiquement">
+            <a:extLst>
+              <a:ext uri="{FF2B5EF4-FFF2-40B4-BE49-F238E27FC236}">
+                <a16:creationId xmlns:a16="http://schemas.microsoft.com/office/drawing/2014/main" id="{F0248986-8C8E-4A50-8D14-A4E4BB999EFB}"/>
+              </a:ext>
+            </a:extLst>
+          </p:cNvPr>
+          <p:cNvPicPr>
+            <a:picLocks noChangeAspect="1"/>
+          </p:cNvPicPr>
+          <p:nvPr/>
+        </p:nvPicPr>
+        <p:blipFill rotWithShape="1">
+          <a:blip r:embed="rId2">
+            <a:extLst>
+              <a:ext uri="{28A0092B-C50C-407E-A947-70E740481C1C}">
+                <a14:useLocalDpi xmlns:a14="http://schemas.microsoft.com/office/drawing/2010/main" val="0"/>
+              </a:ext>
+            </a:extLst>
+          </a:blip>
+          <a:srcRect t="11919" b="8576"/>
+          <a:stretch/>
+        </p:blipFill>
+        <p:spPr>
+          <a:xfrm>
+            <a:off x="20" y="10"/>
+            <a:ext cx="12191980" cy="6857990"/>
+          </a:xfrm>
+          <a:prstGeom prst="rect">
+            <a:avLst/>
+          </a:prstGeom>
+        </p:spPr>
+      </p:pic>
+      <p:pic>
+        <p:nvPicPr>
+          <p:cNvPr id="10" name="Image 9">
+            <a:extLst>
+              <a:ext uri="{FF2B5EF4-FFF2-40B4-BE49-F238E27FC236}">
+                <a16:creationId xmlns:a16="http://schemas.microsoft.com/office/drawing/2014/main" id="{FAAA65C8-2AA9-4725-BD45-C03570CA42D4}"/>
+              </a:ext>
+            </a:extLst>
+          </p:cNvPr>
+          <p:cNvPicPr>
+            <a:picLocks noChangeAspect="1"/>
+          </p:cNvPicPr>
+          <p:nvPr/>
+        </p:nvPicPr>
+        <p:blipFill>
+          <a:blip r:embed="rId3">
+            <a:extLst>
+              <a:ext uri="{28A0092B-C50C-407E-A947-70E740481C1C}">
+                <a14:useLocalDpi xmlns:a14="http://schemas.microsoft.com/office/drawing/2010/main" val="0"/>
+              </a:ext>
+            </a:extLst>
+          </a:blip>
+          <a:stretch>
+            <a:fillRect/>
+          </a:stretch>
+        </p:blipFill>
+        <p:spPr>
+          <a:xfrm>
+            <a:off x="2418140" y="1342239"/>
+            <a:ext cx="5906055" cy="4374173"/>
+          </a:xfrm>
+          <a:prstGeom prst="rect">
+            <a:avLst/>
+          </a:prstGeom>
+        </p:spPr>
+      </p:pic>
+      <p:sp>
+        <p:nvSpPr>
+          <p:cNvPr id="4" name="Titre 1">
+            <a:extLst>
+              <a:ext uri="{FF2B5EF4-FFF2-40B4-BE49-F238E27FC236}">
+                <a16:creationId xmlns:a16="http://schemas.microsoft.com/office/drawing/2014/main" id="{5194D6EF-1EB7-4F41-97C0-9338EBA11917}"/>
+              </a:ext>
+            </a:extLst>
+          </p:cNvPr>
+          <p:cNvSpPr>
+            <a:spLocks noGrp="1"/>
+          </p:cNvSpPr>
+          <p:nvPr>
+            <p:ph type="ctrTitle"/>
+          </p:nvPr>
+        </p:nvSpPr>
+        <p:spPr>
+          <a:xfrm>
+            <a:off x="0" y="134860"/>
+            <a:ext cx="2976465" cy="891507"/>
+          </a:xfrm>
+        </p:spPr>
+        <p:txBody>
+          <a:bodyPr>
+            <a:normAutofit/>
+          </a:bodyPr>
+          <a:lstStyle/>
+          <a:p>
+            <a:r>
+              <a:rPr lang="fr-FR" sz="5400" b="1" dirty="0" err="1">
+                <a:solidFill>
+                  <a:srgbClr val="FF0000"/>
+                </a:solidFill>
+                <a:latin typeface="+mn-lt"/>
+                <a:cs typeface="Times New Roman" panose="02020603050405020304" pitchFamily="18" charset="0"/>
+              </a:rPr>
+              <a:t>Rewards</a:t>
+            </a:r>
+            <a:endParaRPr lang="fr-FR" sz="5400" b="1" dirty="0">
+              <a:solidFill>
+                <a:srgbClr val="FF0000"/>
+              </a:solidFill>
+              <a:latin typeface="+mn-lt"/>
+              <a:cs typeface="Times New Roman" panose="02020603050405020304" pitchFamily="18" charset="0"/>
+            </a:endParaRPr>
+          </a:p>
+        </p:txBody>
+      </p:sp>
+    </p:spTree>
+    <p:extLst>
+      <p:ext uri="{BB962C8B-B14F-4D97-AF65-F5344CB8AC3E}">
+        <p14:creationId xmlns:p14="http://schemas.microsoft.com/office/powerpoint/2010/main" val="287317412"/>
+      </p:ext>
+    </p:extLst>
+  </p:cSld>
+  <p:clrMapOvr>
+    <a:masterClrMapping/>
+  </p:clrMapOvr>
+  <mc:AlternateContent xmlns:mc="http://schemas.openxmlformats.org/markup-compatibility/2006" xmlns:p159="http://schemas.microsoft.com/office/powerpoint/2015/09/main">
+    <mc:Choice Requires="p159">
+      <p:transition xmlns:p14="http://schemas.microsoft.com/office/powerpoint/2010/main" spd="slow" p14:dur="2000">
+        <p159:morph option="byObject"/>
+      </p:transition>
+    </mc:Choice>
+    <mc:Fallback xmlns="">
       <p:transition spd="slow">
         <p:fade/>
       </p:transition>

</xml_diff>

<commit_message>
update prez + update name mesh
</commit_message>
<xml_diff>
--- a/Office_Rage_Presentation.pptx
+++ b/Office_Rage_Presentation.pptx
@@ -269,7 +269,7 @@
           <a:p>
             <a:fld id="{073ED0CC-082F-4160-86E5-0D6041F12778}" type="datetime1">
               <a:rPr lang="en-US" smtClean="0"/>
-              <a:t>11/21/2019</a:t>
+              <a:t>12/18/2019</a:t>
             </a:fld>
             <a:endParaRPr lang="en-US" dirty="0"/>
           </a:p>
@@ -468,7 +468,7 @@
           <a:p>
             <a:fld id="{073ED0CC-082F-4160-86E5-0D6041F12778}" type="datetime1">
               <a:rPr lang="en-US" smtClean="0"/>
-              <a:t>11/21/2019</a:t>
+              <a:t>12/18/2019</a:t>
             </a:fld>
             <a:endParaRPr lang="en-US" dirty="0"/>
           </a:p>
@@ -677,7 +677,7 @@
           <a:p>
             <a:fld id="{073ED0CC-082F-4160-86E5-0D6041F12778}" type="datetime1">
               <a:rPr lang="en-US" smtClean="0"/>
-              <a:t>11/21/2019</a:t>
+              <a:t>12/18/2019</a:t>
             </a:fld>
             <a:endParaRPr lang="en-US" dirty="0"/>
           </a:p>
@@ -876,7 +876,7 @@
           <a:p>
             <a:fld id="{073ED0CC-082F-4160-86E5-0D6041F12778}" type="datetime1">
               <a:rPr lang="en-US" smtClean="0"/>
-              <a:t>11/21/2019</a:t>
+              <a:t>12/18/2019</a:t>
             </a:fld>
             <a:endParaRPr lang="en-US" dirty="0"/>
           </a:p>
@@ -1152,7 +1152,7 @@
           <a:p>
             <a:fld id="{073ED0CC-082F-4160-86E5-0D6041F12778}" type="datetime1">
               <a:rPr lang="en-US" smtClean="0"/>
-              <a:t>11/21/2019</a:t>
+              <a:t>12/18/2019</a:t>
             </a:fld>
             <a:endParaRPr lang="en-US" dirty="0"/>
           </a:p>
@@ -1418,7 +1418,7 @@
           <a:p>
             <a:fld id="{073ED0CC-082F-4160-86E5-0D6041F12778}" type="datetime1">
               <a:rPr lang="en-US" smtClean="0"/>
-              <a:t>11/21/2019</a:t>
+              <a:t>12/18/2019</a:t>
             </a:fld>
             <a:endParaRPr lang="en-US" dirty="0"/>
           </a:p>
@@ -1831,7 +1831,7 @@
           <a:p>
             <a:fld id="{073ED0CC-082F-4160-86E5-0D6041F12778}" type="datetime1">
               <a:rPr lang="en-US" smtClean="0"/>
-              <a:t>11/21/2019</a:t>
+              <a:t>12/18/2019</a:t>
             </a:fld>
             <a:endParaRPr lang="en-US" dirty="0"/>
           </a:p>
@@ -1973,7 +1973,7 @@
           <a:p>
             <a:fld id="{073ED0CC-082F-4160-86E5-0D6041F12778}" type="datetime1">
               <a:rPr lang="en-US" smtClean="0"/>
-              <a:t>11/21/2019</a:t>
+              <a:t>12/18/2019</a:t>
             </a:fld>
             <a:endParaRPr lang="en-US" dirty="0"/>
           </a:p>
@@ -2087,7 +2087,7 @@
           <a:p>
             <a:fld id="{073ED0CC-082F-4160-86E5-0D6041F12778}" type="datetime1">
               <a:rPr lang="en-US" smtClean="0"/>
-              <a:t>11/21/2019</a:t>
+              <a:t>12/18/2019</a:t>
             </a:fld>
             <a:endParaRPr lang="en-US" dirty="0"/>
           </a:p>
@@ -2399,7 +2399,7 @@
           <a:p>
             <a:fld id="{073ED0CC-082F-4160-86E5-0D6041F12778}" type="datetime1">
               <a:rPr lang="en-US" smtClean="0"/>
-              <a:t>11/21/2019</a:t>
+              <a:t>12/18/2019</a:t>
             </a:fld>
             <a:endParaRPr lang="en-US" dirty="0"/>
           </a:p>
@@ -2688,7 +2688,7 @@
           <a:p>
             <a:fld id="{073ED0CC-082F-4160-86E5-0D6041F12778}" type="datetime1">
               <a:rPr lang="en-US" smtClean="0"/>
-              <a:t>11/21/2019</a:t>
+              <a:t>12/18/2019</a:t>
             </a:fld>
             <a:endParaRPr lang="en-US" dirty="0"/>
           </a:p>
@@ -2930,7 +2930,7 @@
           <a:p>
             <a:fld id="{073ED0CC-082F-4160-86E5-0D6041F12778}" type="datetime1">
               <a:rPr lang="en-US" smtClean="0"/>
-              <a:t>11/21/2019</a:t>
+              <a:t>12/18/2019</a:t>
             </a:fld>
             <a:endParaRPr lang="en-US" dirty="0"/>
           </a:p>
@@ -4168,7 +4168,7 @@
                 <a:latin typeface="+mn-lt"/>
                 <a:cs typeface="Times New Roman" panose="02020603050405020304" pitchFamily="18" charset="0"/>
               </a:rPr>
-              <a:t>Objectif</a:t>
+              <a:t>Goal</a:t>
             </a:r>
           </a:p>
         </p:txBody>

</xml_diff>